<commit_message>
Added issues with R and C
</commit_message>
<xml_diff>
--- a/paper_presentation/Monocamera Recovery.pptx
+++ b/paper_presentation/Monocamera Recovery.pptx
@@ -1293,10 +1293,6 @@
           <a:bodyPr/>
           <a:lstStyle/>
           <a:p>
-            <a:r>
-              <a:rPr lang="en-US" dirty="0" smtClean="0"/>
-              <a:t>Each frame is processed independently. A potential area to explore would be to use continuity of locations of corners.</a:t>
-            </a:r>
             <a:endParaRPr lang="en-US" dirty="0"/>
           </a:p>
         </p:txBody>
@@ -7763,7 +7759,7 @@
         </p:blipFill>
         <p:spPr bwMode="auto">
           <a:xfrm>
-            <a:off x="5943600" y="1219200"/>
+            <a:off x="5972629" y="3276600"/>
             <a:ext cx="2853779" cy="3352800"/>
           </a:xfrm>
           <a:prstGeom prst="rect">
@@ -7804,7 +7800,7 @@
         </p:blipFill>
         <p:spPr bwMode="auto">
           <a:xfrm>
-            <a:off x="5998889" y="4601592"/>
+            <a:off x="6027918" y="1186543"/>
             <a:ext cx="2743200" cy="2057400"/>
           </a:xfrm>
           <a:prstGeom prst="rect">
@@ -8681,9 +8677,38 @@
           <a:lstStyle/>
           <a:p>
             <a:r>
-              <a:rPr lang="en-US" dirty="0" smtClean="0"/>
+              <a:rPr lang="en-US" dirty="0"/>
+              <a:t>Rotation Matrix and Position Vector</a:t>
+            </a:r>
+          </a:p>
+          <a:p>
+            <a:pPr lvl="1"/>
+            <a:r>
+              <a:rPr lang="en-US" dirty="0"/>
+              <a:t>Raw result is partially flipped</a:t>
+            </a:r>
+          </a:p>
+          <a:p>
+            <a:pPr lvl="1"/>
+            <a:r>
+              <a:rPr lang="en-US" dirty="0"/>
+              <a:t>For R, I needed to extract the </a:t>
+            </a:r>
+            <a:r>
+              <a:rPr lang="en-US" dirty="0" err="1"/>
+              <a:t>Eulerian</a:t>
+            </a:r>
+            <a:r>
+              <a:rPr lang="en-US"/>
+              <a:t> angles, and rebuild R based on the flipped rotations.</a:t>
+            </a:r>
+          </a:p>
+          <a:p>
+            <a:r>
+              <a:rPr lang="en-US" smtClean="0"/>
               <a:t>Accuracy</a:t>
             </a:r>
+            <a:endParaRPr lang="en-US" dirty="0" smtClean="0"/>
           </a:p>
           <a:p>
             <a:pPr lvl="1"/>
@@ -8691,24 +8716,11 @@
               <a:rPr lang="en-US" dirty="0" smtClean="0"/>
               <a:t>Can be improved by averaging</a:t>
             </a:r>
-            <a:endParaRPr lang="en-US" dirty="0"/>
           </a:p>
           <a:p>
             <a:r>
               <a:rPr lang="en-US" dirty="0" smtClean="0"/>
-              <a:t>Use continuity of </a:t>
-            </a:r>
-            <a:r>
-              <a:rPr lang="en-US" smtClean="0"/>
-              <a:t>video stream </a:t>
-            </a:r>
-            <a:r>
-              <a:rPr lang="en-US" dirty="0" smtClean="0"/>
-              <a:t>to improve </a:t>
-            </a:r>
-            <a:r>
-              <a:rPr lang="en-US" smtClean="0"/>
-              <a:t>corner detection</a:t>
+              <a:t>Use continuity of video stream to improve corner detection</a:t>
             </a:r>
             <a:endParaRPr lang="en-US" dirty="0"/>
           </a:p>
@@ -9657,6 +9669,13 @@
   <p:clrMapOvr>
     <a:masterClrMapping/>
   </p:clrMapOvr>
+  <p:timing>
+    <p:tnLst>
+      <p:par>
+        <p:cTn id="1" dur="indefinite" restart="never" nodeType="tmRoot"/>
+      </p:par>
+    </p:tnLst>
+  </p:timing>
 </p:sld>
 </file>
 
@@ -9700,25 +9719,60 @@
           </a:p>
         </p:txBody>
       </p:sp>
-      <p:sp>
-        <p:nvSpPr>
-          <p:cNvPr id="3" name="Content Placeholder 2"/>
-          <p:cNvSpPr>
-            <a:spLocks noGrp="1"/>
-          </p:cNvSpPr>
-          <p:nvPr>
-            <p:ph idx="1"/>
-          </p:nvPr>
-        </p:nvSpPr>
-        <p:spPr/>
-        <p:txBody>
-          <a:bodyPr/>
-          <a:lstStyle/>
-          <a:p>
-            <a:endParaRPr lang="en-US"/>
-          </a:p>
-        </p:txBody>
-      </p:sp>
+      <p:pic>
+        <p:nvPicPr>
+          <p:cNvPr id="2051" name="Picture 3"/>
+          <p:cNvPicPr>
+            <a:picLocks noChangeAspect="1" noChangeArrowheads="1"/>
+          </p:cNvPicPr>
+          <p:nvPr/>
+        </p:nvPicPr>
+        <p:blipFill>
+          <a:blip r:embed="rId2">
+            <a:extLst>
+              <a:ext uri="{28A0092B-C50C-407E-A947-70E740481C1C}">
+                <a14:useLocalDpi xmlns:a14="http://schemas.microsoft.com/office/drawing/2010/main" val="0"/>
+              </a:ext>
+            </a:extLst>
+          </a:blip>
+          <a:srcRect/>
+          <a:stretch>
+            <a:fillRect/>
+          </a:stretch>
+        </p:blipFill>
+        <p:spPr bwMode="auto">
+          <a:xfrm>
+            <a:off x="1905000" y="1295400"/>
+            <a:ext cx="5638800" cy="5064259"/>
+          </a:xfrm>
+          <a:prstGeom prst="rect">
+            <a:avLst/>
+          </a:prstGeom>
+          <a:noFill/>
+          <a:ln>
+            <a:noFill/>
+          </a:ln>
+          <a:extLst>
+            <a:ext uri="{909E8E84-426E-40DD-AFC4-6F175D3DCCD1}">
+              <a14:hiddenFill xmlns:a14="http://schemas.microsoft.com/office/drawing/2010/main">
+                <a:solidFill>
+                  <a:schemeClr val="accent1"/>
+                </a:solidFill>
+              </a14:hiddenFill>
+            </a:ext>
+            <a:ext uri="{91240B29-F687-4F45-9708-019B960494DF}">
+              <a14:hiddenLine xmlns:a14="http://schemas.microsoft.com/office/drawing/2010/main" w="9525">
+                <a:solidFill>
+                  <a:schemeClr val="tx1"/>
+                </a:solidFill>
+                <a:miter lim="800000"/>
+                <a:headEnd/>
+                <a:tailEnd/>
+              </a14:hiddenLine>
+            </a:ext>
+          </a:extLst>
+        </p:spPr>
+      </p:pic>
     </p:spTree>
     <p:extLst>
       <p:ext uri="{BB962C8B-B14F-4D97-AF65-F5344CB8AC3E}">

</xml_diff>

<commit_message>
Finished fine-tuning for presentation
Made movements smoother by averaging
Lowered the contour area size threshold to accept farther distance
Finished presentation slides
</commit_message>
<xml_diff>
--- a/paper_presentation/Monocamera Recovery.pptx
+++ b/paper_presentation/Monocamera Recovery.pptx
@@ -206,7 +206,7 @@
           <a:p>
             <a:fld id="{4CDF4B4D-C26F-45E1-8B5D-EB0AB242FC95}" type="datetimeFigureOut">
               <a:rPr lang="en-US" smtClean="0"/>
-              <a:t>5/5/2013</a:t>
+              <a:t>5/7/2013</a:t>
             </a:fld>
             <a:endParaRPr lang="en-US"/>
           </a:p>
@@ -956,30 +956,15 @@
           <a:p>
             <a:r>
               <a:rPr lang="en-US" dirty="0" smtClean="0"/>
-              <a:t>Discuss calibration to color</a:t>
+              <a:t>Use the </a:t>
+            </a:r>
+            <a:r>
+              <a:rPr lang="en-US" dirty="0" err="1" smtClean="0"/>
+              <a:t>OpenCV</a:t>
             </a:r>
             <a:r>
               <a:rPr lang="en-US" baseline="0" dirty="0" smtClean="0"/>
-              <a:t> that is used. (Nice, to account for lighting differences)</a:t>
-            </a:r>
-            <a:endParaRPr lang="en-US" dirty="0" smtClean="0"/>
-          </a:p>
-          <a:p>
-            <a:r>
-              <a:rPr lang="en-US" dirty="0" smtClean="0"/>
-              <a:t>Discuss that threshold, how robust.</a:t>
-            </a:r>
-          </a:p>
-          <a:p>
-            <a:r>
-              <a:rPr lang="en-US" dirty="0" smtClean="0"/>
-              <a:t>Other colors: red </a:t>
-            </a:r>
-            <a:r>
-              <a:rPr lang="en-US" dirty="0" smtClean="0">
-                <a:sym typeface="Wingdings" pitchFamily="2" charset="2"/>
-              </a:rPr>
-              <a:t> blue?</a:t>
+              <a:t> input interface to dynamically collect color so that the program can adaptively set the red mask</a:t>
             </a:r>
             <a:endParaRPr lang="en-US" dirty="0"/>
           </a:p>
@@ -1195,20 +1180,6 @@
           <a:bodyPr/>
           <a:lstStyle/>
           <a:p>
-            <a:r>
-              <a:rPr lang="en-US" dirty="0" smtClean="0"/>
-              <a:t>Remind of variables. H, x1, x2,</a:t>
-            </a:r>
-            <a:r>
-              <a:rPr lang="en-US" baseline="0" dirty="0" smtClean="0"/>
-              <a:t> … in the image.</a:t>
-            </a:r>
-          </a:p>
-          <a:p>
-            <a:r>
-              <a:rPr lang="en-US" baseline="0" dirty="0" smtClean="0"/>
-              <a:t>Note about origin.</a:t>
-            </a:r>
             <a:endParaRPr lang="en-US" dirty="0"/>
           </a:p>
         </p:txBody>
@@ -1514,7 +1485,7 @@
           <a:p>
             <a:fld id="{21F389F5-5388-4C21-BF3E-899451C5E555}" type="datetimeFigureOut">
               <a:rPr lang="en-US" smtClean="0"/>
-              <a:t>5/5/2013</a:t>
+              <a:t>5/7/2013</a:t>
             </a:fld>
             <a:endParaRPr lang="en-US"/>
           </a:p>
@@ -1684,7 +1655,7 @@
           <a:p>
             <a:fld id="{21F389F5-5388-4C21-BF3E-899451C5E555}" type="datetimeFigureOut">
               <a:rPr lang="en-US" smtClean="0"/>
-              <a:t>5/5/2013</a:t>
+              <a:t>5/7/2013</a:t>
             </a:fld>
             <a:endParaRPr lang="en-US"/>
           </a:p>
@@ -1864,7 +1835,7 @@
           <a:p>
             <a:fld id="{21F389F5-5388-4C21-BF3E-899451C5E555}" type="datetimeFigureOut">
               <a:rPr lang="en-US" smtClean="0"/>
-              <a:t>5/5/2013</a:t>
+              <a:t>5/7/2013</a:t>
             </a:fld>
             <a:endParaRPr lang="en-US"/>
           </a:p>
@@ -2034,7 +2005,7 @@
           <a:p>
             <a:fld id="{21F389F5-5388-4C21-BF3E-899451C5E555}" type="datetimeFigureOut">
               <a:rPr lang="en-US" smtClean="0"/>
-              <a:t>5/5/2013</a:t>
+              <a:t>5/7/2013</a:t>
             </a:fld>
             <a:endParaRPr lang="en-US"/>
           </a:p>
@@ -2280,7 +2251,7 @@
           <a:p>
             <a:fld id="{21F389F5-5388-4C21-BF3E-899451C5E555}" type="datetimeFigureOut">
               <a:rPr lang="en-US" smtClean="0"/>
-              <a:t>5/5/2013</a:t>
+              <a:t>5/7/2013</a:t>
             </a:fld>
             <a:endParaRPr lang="en-US"/>
           </a:p>
@@ -2568,7 +2539,7 @@
           <a:p>
             <a:fld id="{21F389F5-5388-4C21-BF3E-899451C5E555}" type="datetimeFigureOut">
               <a:rPr lang="en-US" smtClean="0"/>
-              <a:t>5/5/2013</a:t>
+              <a:t>5/7/2013</a:t>
             </a:fld>
             <a:endParaRPr lang="en-US"/>
           </a:p>
@@ -2990,7 +2961,7 @@
           <a:p>
             <a:fld id="{21F389F5-5388-4C21-BF3E-899451C5E555}" type="datetimeFigureOut">
               <a:rPr lang="en-US" smtClean="0"/>
-              <a:t>5/5/2013</a:t>
+              <a:t>5/7/2013</a:t>
             </a:fld>
             <a:endParaRPr lang="en-US"/>
           </a:p>
@@ -3108,7 +3079,7 @@
           <a:p>
             <a:fld id="{21F389F5-5388-4C21-BF3E-899451C5E555}" type="datetimeFigureOut">
               <a:rPr lang="en-US" smtClean="0"/>
-              <a:t>5/5/2013</a:t>
+              <a:t>5/7/2013</a:t>
             </a:fld>
             <a:endParaRPr lang="en-US"/>
           </a:p>
@@ -3203,7 +3174,7 @@
           <a:p>
             <a:fld id="{21F389F5-5388-4C21-BF3E-899451C5E555}" type="datetimeFigureOut">
               <a:rPr lang="en-US" smtClean="0"/>
-              <a:t>5/5/2013</a:t>
+              <a:t>5/7/2013</a:t>
             </a:fld>
             <a:endParaRPr lang="en-US"/>
           </a:p>
@@ -3480,7 +3451,7 @@
           <a:p>
             <a:fld id="{21F389F5-5388-4C21-BF3E-899451C5E555}" type="datetimeFigureOut">
               <a:rPr lang="en-US" smtClean="0"/>
-              <a:t>5/5/2013</a:t>
+              <a:t>5/7/2013</a:t>
             </a:fld>
             <a:endParaRPr lang="en-US"/>
           </a:p>
@@ -3733,7 +3704,7 @@
           <a:p>
             <a:fld id="{21F389F5-5388-4C21-BF3E-899451C5E555}" type="datetimeFigureOut">
               <a:rPr lang="en-US" smtClean="0"/>
-              <a:t>5/5/2013</a:t>
+              <a:t>5/7/2013</a:t>
             </a:fld>
             <a:endParaRPr lang="en-US"/>
           </a:p>
@@ -3946,7 +3917,7 @@
           <a:p>
             <a:fld id="{21F389F5-5388-4C21-BF3E-899451C5E555}" type="datetimeFigureOut">
               <a:rPr lang="en-US" smtClean="0"/>
-              <a:t>5/5/2013</a:t>
+              <a:t>5/7/2013</a:t>
             </a:fld>
             <a:endParaRPr lang="en-US"/>
           </a:p>
@@ -4321,6 +4292,70 @@
           <a:chExt cx="0" cy="0"/>
         </a:xfrm>
       </p:grpSpPr>
+      <p:pic>
+        <p:nvPicPr>
+          <p:cNvPr id="1027" name="Picture 3"/>
+          <p:cNvPicPr>
+            <a:picLocks noChangeAspect="1" noChangeArrowheads="1"/>
+          </p:cNvPicPr>
+          <p:nvPr/>
+        </p:nvPicPr>
+        <p:blipFill>
+          <a:blip r:embed="rId3">
+            <a:clrChange>
+              <a:clrFrom>
+                <a:srgbClr val="FFFFFF"/>
+              </a:clrFrom>
+              <a:clrTo>
+                <a:srgbClr val="FFFFFF">
+                  <a:alpha val="0"/>
+                </a:srgbClr>
+              </a:clrTo>
+            </a:clrChange>
+            <a:extLst>
+              <a:ext uri="{28A0092B-C50C-407E-A947-70E740481C1C}">
+                <a14:useLocalDpi xmlns:a14="http://schemas.microsoft.com/office/drawing/2010/main" val="0"/>
+              </a:ext>
+            </a:extLst>
+          </a:blip>
+          <a:srcRect/>
+          <a:stretch>
+            <a:fillRect/>
+          </a:stretch>
+        </p:blipFill>
+        <p:spPr bwMode="auto">
+          <a:xfrm>
+            <a:off x="-1" y="1615215"/>
+            <a:ext cx="9144001" cy="5242785"/>
+          </a:xfrm>
+          <a:prstGeom prst="rect">
+            <a:avLst/>
+          </a:prstGeom>
+          <a:noFill/>
+          <a:ln>
+            <a:noFill/>
+          </a:ln>
+          <a:extLst>
+            <a:ext uri="{909E8E84-426E-40DD-AFC4-6F175D3DCCD1}">
+              <a14:hiddenFill xmlns:a14="http://schemas.microsoft.com/office/drawing/2010/main">
+                <a:solidFill>
+                  <a:schemeClr val="accent1"/>
+                </a:solidFill>
+              </a14:hiddenFill>
+            </a:ext>
+            <a:ext uri="{91240B29-F687-4F45-9708-019B960494DF}">
+              <a14:hiddenLine xmlns:a14="http://schemas.microsoft.com/office/drawing/2010/main" w="9525">
+                <a:solidFill>
+                  <a:schemeClr val="tx1"/>
+                </a:solidFill>
+                <a:miter lim="800000"/>
+                <a:headEnd/>
+                <a:tailEnd/>
+              </a14:hiddenLine>
+            </a:ext>
+          </a:extLst>
+        </p:spPr>
+      </p:pic>
       <p:sp>
         <p:nvSpPr>
           <p:cNvPr id="2" name="Title 1"/>
@@ -4331,7 +4366,12 @@
             <p:ph type="ctrTitle"/>
           </p:nvPr>
         </p:nvSpPr>
-        <p:spPr/>
+        <p:spPr>
+          <a:xfrm>
+            <a:off x="685800" y="152400"/>
+            <a:ext cx="7772400" cy="1470025"/>
+          </a:xfrm>
+        </p:spPr>
         <p:txBody>
           <a:bodyPr/>
           <a:lstStyle/>
@@ -4362,7 +4402,12 @@
             <p:ph type="subTitle" idx="1"/>
           </p:nvPr>
         </p:nvSpPr>
-        <p:spPr/>
+        <p:spPr>
+          <a:xfrm>
+            <a:off x="5562600" y="5239656"/>
+            <a:ext cx="3466502" cy="1161144"/>
+          </a:xfrm>
+        </p:spPr>
         <p:txBody>
           <a:bodyPr>
             <a:normAutofit/>
@@ -4370,32 +4415,28 @@
           <a:lstStyle/>
           <a:p>
             <a:r>
-              <a:rPr lang="en-US" dirty="0" err="1" smtClean="0"/>
+              <a:rPr lang="en-US" sz="1800" dirty="0" err="1" smtClean="0"/>
               <a:t>Haoran</a:t>
             </a:r>
             <a:r>
-              <a:rPr lang="en-US" dirty="0" smtClean="0"/>
-              <a:t> Liang (Simon</a:t>
-            </a:r>
-            <a:r>
-              <a:rPr lang="en-US" dirty="0" smtClean="0"/>
-              <a:t>)</a:t>
-            </a:r>
-          </a:p>
-          <a:p>
-            <a:r>
-              <a:rPr lang="en-US" dirty="0"/>
+              <a:rPr lang="en-US" sz="1800" dirty="0" smtClean="0"/>
+              <a:t> Liang (Simon)</a:t>
+            </a:r>
+          </a:p>
+          <a:p>
+            <a:r>
+              <a:rPr lang="en-US" sz="1800" dirty="0"/>
               <a:t>Multidisciplinary Minor in Imaging</a:t>
             </a:r>
           </a:p>
           <a:p>
             <a:r>
-              <a:rPr lang="en-US" dirty="0"/>
+              <a:rPr lang="en-US" sz="1800" dirty="0"/>
               <a:t>Final Project Presentation</a:t>
             </a:r>
           </a:p>
           <a:p>
-            <a:endParaRPr lang="en-US" dirty="0" smtClean="0"/>
+            <a:endParaRPr lang="en-US" sz="1800" dirty="0" smtClean="0"/>
           </a:p>
         </p:txBody>
       </p:sp>
@@ -4409,6 +4450,13 @@
   <p:clrMapOvr>
     <a:masterClrMapping/>
   </p:clrMapOvr>
+  <p:timing>
+    <p:tnLst>
+      <p:par>
+        <p:cTn id="1" dur="indefinite" restart="never" nodeType="tmRoot"/>
+      </p:par>
+    </p:tnLst>
+  </p:timing>
 </p:sld>
 </file>
 
@@ -4456,8 +4504,8 @@
           </a:p>
         </p:txBody>
       </p:sp>
-      <mc:AlternateContent xmlns:mc="http://schemas.openxmlformats.org/markup-compatibility/2006">
-        <mc:Choice xmlns:a14="http://schemas.microsoft.com/office/drawing/2010/main" Requires="a14">
+      <mc:AlternateContent xmlns:mc="http://schemas.openxmlformats.org/markup-compatibility/2006" xmlns:a14="http://schemas.microsoft.com/office/drawing/2010/main">
+        <mc:Choice Requires="a14">
           <p:sp>
             <p:nvSpPr>
               <p:cNvPr id="3" name="Content Placeholder 2"/>
@@ -4471,17 +4519,13 @@
             <p:spPr/>
             <p:txBody>
               <a:bodyPr>
-                <a:normAutofit fontScale="55000" lnSpcReduction="20000"/>
+                <a:normAutofit fontScale="47500" lnSpcReduction="20000"/>
               </a:bodyPr>
               <a:lstStyle/>
               <a:p>
                 <a:r>
                   <a:rPr lang="en-US" sz="3300" dirty="0" smtClean="0"/>
-                  <a:t>Get </a:t>
-                </a:r>
-                <a:r>
-                  <a:rPr lang="en-US" sz="3300" dirty="0" smtClean="0"/>
-                  <a:t>H (</a:t>
+                  <a:t>Get H (</a:t>
                 </a:r>
                 <a:r>
                   <a:rPr lang="en-US" sz="3300" dirty="0" err="1" smtClean="0"/>
@@ -4489,11 +4533,7 @@
                 </a:r>
                 <a:r>
                   <a:rPr lang="en-US" sz="3300" dirty="0" smtClean="0"/>
-                  <a:t> transform matrix) </a:t>
-                </a:r>
-                <a:r>
-                  <a:rPr lang="en-US" sz="3300" dirty="0" smtClean="0"/>
-                  <a:t>with the real size of the square (1 in. = 1 </a:t>
+                  <a:t> transform matrix) with the real size of the square (1 in. = 1 </a:t>
                 </a:r>
                 <a:r>
                   <a:rPr lang="en-US" sz="3300" dirty="0" err="1" smtClean="0"/>
@@ -4501,11 +4541,13 @@
                 </a:r>
                 <a:r>
                   <a:rPr lang="en-US" sz="3300" dirty="0" smtClean="0"/>
-                  <a:t>) and the corner detector </a:t>
+                  <a:t>) and the corner detector result</a:t>
                 </a:r>
+              </a:p>
+              <a:p>
                 <a:r>
                   <a:rPr lang="en-US" sz="3300" dirty="0" smtClean="0"/>
-                  <a:t>result</a:t>
+                  <a:t>Set origin to the center of the square</a:t>
                 </a:r>
               </a:p>
               <a:p>
@@ -7072,6 +7114,384 @@
                           </m:m>
                         </m:e>
                       </m:d>
+                      <m:r>
+                        <a:rPr lang="en-US" sz="2500" b="0" i="0" smtClean="0">
+                          <a:latin typeface="Cambria Math"/>
+                        </a:rPr>
+                        <m:t>⇒</m:t>
+                      </m:r>
+                      <m:d>
+                        <m:dPr>
+                          <m:begChr m:val="["/>
+                          <m:endChr m:val="]"/>
+                          <m:ctrlPr>
+                            <a:rPr lang="en-US" sz="2500" b="0" i="1" smtClean="0">
+                              <a:latin typeface="Cambria Math"/>
+                            </a:rPr>
+                          </m:ctrlPr>
+                        </m:dPr>
+                        <m:e>
+                          <m:m>
+                            <m:mPr>
+                              <m:mcs>
+                                <m:mc>
+                                  <m:mcPr>
+                                    <m:count m:val="1"/>
+                                    <m:mcJc m:val="center"/>
+                                  </m:mcPr>
+                                </m:mc>
+                              </m:mcs>
+                              <m:ctrlPr>
+                                <a:rPr lang="en-US" sz="2500" b="0" i="1" smtClean="0">
+                                  <a:latin typeface="Cambria Math"/>
+                                </a:rPr>
+                              </m:ctrlPr>
+                            </m:mPr>
+                            <m:mr>
+                              <m:e>
+                                <m:m>
+                                  <m:mPr>
+                                    <m:mcs>
+                                      <m:mc>
+                                        <m:mcPr>
+                                          <m:count m:val="1"/>
+                                          <m:mcJc m:val="center"/>
+                                        </m:mcPr>
+                                      </m:mc>
+                                    </m:mcs>
+                                    <m:ctrlPr>
+                                      <a:rPr lang="en-US" sz="2500" b="0" i="1" smtClean="0">
+                                        <a:latin typeface="Cambria Math"/>
+                                      </a:rPr>
+                                    </m:ctrlPr>
+                                  </m:mPr>
+                                  <m:mr>
+                                    <m:e>
+                                      <m:sSub>
+                                        <m:sSubPr>
+                                          <m:ctrlPr>
+                                            <a:rPr lang="en-US" sz="2500" b="0" i="1" smtClean="0">
+                                              <a:latin typeface="Cambria Math"/>
+                                            </a:rPr>
+                                          </m:ctrlPr>
+                                        </m:sSubPr>
+                                        <m:e>
+                                          <m:r>
+                                            <m:rPr>
+                                              <m:brk m:alnAt="7"/>
+                                            </m:rPr>
+                                            <a:rPr lang="en-US" sz="2500" b="0" i="1" smtClean="0">
+                                              <a:latin typeface="Cambria Math"/>
+                                            </a:rPr>
+                                            <m:t>𝐻</m:t>
+                                          </m:r>
+                                        </m:e>
+                                        <m:sub>
+                                          <m:r>
+                                            <m:rPr>
+                                              <m:brk m:alnAt="7"/>
+                                            </m:rPr>
+                                            <a:rPr lang="en-US" sz="2500" b="0" i="1" smtClean="0">
+                                              <a:latin typeface="Cambria Math"/>
+                                            </a:rPr>
+                                            <m:t>1</m:t>
+                                          </m:r>
+                                        </m:sub>
+                                      </m:sSub>
+                                    </m:e>
+                                  </m:mr>
+                                  <m:mr>
+                                    <m:e>
+                                      <m:sSub>
+                                        <m:sSubPr>
+                                          <m:ctrlPr>
+                                            <a:rPr lang="en-US" sz="2500" b="0" i="1" smtClean="0">
+                                              <a:latin typeface="Cambria Math"/>
+                                            </a:rPr>
+                                          </m:ctrlPr>
+                                        </m:sSubPr>
+                                        <m:e>
+                                          <m:r>
+                                            <a:rPr lang="en-US" sz="2500" b="0" i="1" smtClean="0">
+                                              <a:latin typeface="Cambria Math"/>
+                                            </a:rPr>
+                                            <m:t>𝐻</m:t>
+                                          </m:r>
+                                        </m:e>
+                                        <m:sub>
+                                          <m:r>
+                                            <a:rPr lang="en-US" sz="2500" b="0" i="1" smtClean="0">
+                                              <a:latin typeface="Cambria Math"/>
+                                            </a:rPr>
+                                            <m:t>2</m:t>
+                                          </m:r>
+                                        </m:sub>
+                                      </m:sSub>
+                                    </m:e>
+                                  </m:mr>
+                                  <m:mr>
+                                    <m:e>
+                                      <m:sSub>
+                                        <m:sSubPr>
+                                          <m:ctrlPr>
+                                            <a:rPr lang="en-US" sz="2500" b="0" i="1" smtClean="0">
+                                              <a:latin typeface="Cambria Math"/>
+                                            </a:rPr>
+                                          </m:ctrlPr>
+                                        </m:sSubPr>
+                                        <m:e>
+                                          <m:r>
+                                            <a:rPr lang="en-US" sz="2500" b="0" i="1" smtClean="0">
+                                              <a:latin typeface="Cambria Math"/>
+                                            </a:rPr>
+                                            <m:t>𝐻</m:t>
+                                          </m:r>
+                                        </m:e>
+                                        <m:sub>
+                                          <m:r>
+                                            <a:rPr lang="en-US" sz="2500" b="0" i="1" smtClean="0">
+                                              <a:latin typeface="Cambria Math"/>
+                                            </a:rPr>
+                                            <m:t>3</m:t>
+                                          </m:r>
+                                        </m:sub>
+                                      </m:sSub>
+                                    </m:e>
+                                  </m:mr>
+                                </m:m>
+                              </m:e>
+                            </m:mr>
+                            <m:mr>
+                              <m:e>
+                                <m:m>
+                                  <m:mPr>
+                                    <m:mcs>
+                                      <m:mc>
+                                        <m:mcPr>
+                                          <m:count m:val="1"/>
+                                          <m:mcJc m:val="center"/>
+                                        </m:mcPr>
+                                      </m:mc>
+                                    </m:mcs>
+                                    <m:ctrlPr>
+                                      <a:rPr lang="en-US" sz="2500" b="0" i="1" smtClean="0">
+                                        <a:latin typeface="Cambria Math"/>
+                                      </a:rPr>
+                                    </m:ctrlPr>
+                                  </m:mPr>
+                                  <m:mr>
+                                    <m:e>
+                                      <m:sSub>
+                                        <m:sSubPr>
+                                          <m:ctrlPr>
+                                            <a:rPr lang="en-US" sz="2500" b="0" i="1" smtClean="0">
+                                              <a:latin typeface="Cambria Math"/>
+                                            </a:rPr>
+                                          </m:ctrlPr>
+                                        </m:sSubPr>
+                                        <m:e>
+                                          <m:r>
+                                            <m:rPr>
+                                              <m:brk m:alnAt="7"/>
+                                            </m:rPr>
+                                            <a:rPr lang="en-US" sz="2500" b="0" i="1" smtClean="0">
+                                              <a:latin typeface="Cambria Math"/>
+                                            </a:rPr>
+                                            <m:t>𝐻</m:t>
+                                          </m:r>
+                                        </m:e>
+                                        <m:sub>
+                                          <m:r>
+                                            <m:rPr>
+                                              <m:brk m:alnAt="7"/>
+                                            </m:rPr>
+                                            <a:rPr lang="en-US" sz="2500" b="0" i="1" smtClean="0">
+                                              <a:latin typeface="Cambria Math"/>
+                                            </a:rPr>
+                                            <m:t>4</m:t>
+                                          </m:r>
+                                        </m:sub>
+                                      </m:sSub>
+                                    </m:e>
+                                  </m:mr>
+                                  <m:mr>
+                                    <m:e>
+                                      <m:sSub>
+                                        <m:sSubPr>
+                                          <m:ctrlPr>
+                                            <a:rPr lang="en-US" sz="2500" b="0" i="1" smtClean="0">
+                                              <a:latin typeface="Cambria Math"/>
+                                            </a:rPr>
+                                          </m:ctrlPr>
+                                        </m:sSubPr>
+                                        <m:e>
+                                          <m:r>
+                                            <a:rPr lang="en-US" sz="2500" b="0" i="1" smtClean="0">
+                                              <a:latin typeface="Cambria Math"/>
+                                            </a:rPr>
+                                            <m:t>𝐻</m:t>
+                                          </m:r>
+                                        </m:e>
+                                        <m:sub>
+                                          <m:r>
+                                            <a:rPr lang="en-US" sz="2500" b="0" i="1" smtClean="0">
+                                              <a:latin typeface="Cambria Math"/>
+                                            </a:rPr>
+                                            <m:t>5</m:t>
+                                          </m:r>
+                                        </m:sub>
+                                      </m:sSub>
+                                    </m:e>
+                                  </m:mr>
+                                  <m:mr>
+                                    <m:e>
+                                      <m:sSub>
+                                        <m:sSubPr>
+                                          <m:ctrlPr>
+                                            <a:rPr lang="en-US" sz="2500" b="0" i="1" smtClean="0">
+                                              <a:latin typeface="Cambria Math"/>
+                                            </a:rPr>
+                                          </m:ctrlPr>
+                                        </m:sSubPr>
+                                        <m:e>
+                                          <m:r>
+                                            <a:rPr lang="en-US" sz="2500" b="0" i="1" smtClean="0">
+                                              <a:latin typeface="Cambria Math"/>
+                                            </a:rPr>
+                                            <m:t>𝐻</m:t>
+                                          </m:r>
+                                        </m:e>
+                                        <m:sub>
+                                          <m:r>
+                                            <a:rPr lang="en-US" sz="2500" b="0" i="1" smtClean="0">
+                                              <a:latin typeface="Cambria Math"/>
+                                            </a:rPr>
+                                            <m:t>6</m:t>
+                                          </m:r>
+                                        </m:sub>
+                                      </m:sSub>
+                                    </m:e>
+                                  </m:mr>
+                                </m:m>
+                              </m:e>
+                            </m:mr>
+                            <m:mr>
+                              <m:e>
+                                <m:m>
+                                  <m:mPr>
+                                    <m:mcs>
+                                      <m:mc>
+                                        <m:mcPr>
+                                          <m:count m:val="1"/>
+                                          <m:mcJc m:val="center"/>
+                                        </m:mcPr>
+                                      </m:mc>
+                                    </m:mcs>
+                                    <m:ctrlPr>
+                                      <a:rPr lang="en-US" sz="2500" b="0" i="1" smtClean="0">
+                                        <a:latin typeface="Cambria Math"/>
+                                      </a:rPr>
+                                    </m:ctrlPr>
+                                  </m:mPr>
+                                  <m:mr>
+                                    <m:e>
+                                      <m:sSub>
+                                        <m:sSubPr>
+                                          <m:ctrlPr>
+                                            <a:rPr lang="en-US" sz="2500" b="0" i="1" smtClean="0">
+                                              <a:latin typeface="Cambria Math"/>
+                                            </a:rPr>
+                                          </m:ctrlPr>
+                                        </m:sSubPr>
+                                        <m:e>
+                                          <m:r>
+                                            <m:rPr>
+                                              <m:brk m:alnAt="7"/>
+                                            </m:rPr>
+                                            <a:rPr lang="en-US" sz="2500" b="0" i="1" smtClean="0">
+                                              <a:latin typeface="Cambria Math"/>
+                                            </a:rPr>
+                                            <m:t>𝐻</m:t>
+                                          </m:r>
+                                        </m:e>
+                                        <m:sub>
+                                          <m:r>
+                                            <m:rPr>
+                                              <m:brk m:alnAt="7"/>
+                                            </m:rPr>
+                                            <a:rPr lang="en-US" sz="2500" b="0" i="1" smtClean="0">
+                                              <a:latin typeface="Cambria Math"/>
+                                            </a:rPr>
+                                            <m:t>7</m:t>
+                                          </m:r>
+                                        </m:sub>
+                                      </m:sSub>
+                                    </m:e>
+                                  </m:mr>
+                                  <m:mr>
+                                    <m:e>
+                                      <m:sSub>
+                                        <m:sSubPr>
+                                          <m:ctrlPr>
+                                            <a:rPr lang="en-US" sz="2500" b="0" i="1" smtClean="0">
+                                              <a:latin typeface="Cambria Math"/>
+                                            </a:rPr>
+                                          </m:ctrlPr>
+                                        </m:sSubPr>
+                                        <m:e>
+                                          <m:r>
+                                            <a:rPr lang="en-US" sz="2500" b="0" i="1" smtClean="0">
+                                              <a:latin typeface="Cambria Math"/>
+                                            </a:rPr>
+                                            <m:t>𝐻</m:t>
+                                          </m:r>
+                                        </m:e>
+                                        <m:sub>
+                                          <m:r>
+                                            <a:rPr lang="en-US" sz="2500" b="0" i="1" smtClean="0">
+                                              <a:latin typeface="Cambria Math"/>
+                                            </a:rPr>
+                                            <m:t>8</m:t>
+                                          </m:r>
+                                        </m:sub>
+                                      </m:sSub>
+                                    </m:e>
+                                  </m:mr>
+                                  <m:mr>
+                                    <m:e>
+                                      <m:sSub>
+                                        <m:sSubPr>
+                                          <m:ctrlPr>
+                                            <a:rPr lang="en-US" sz="2500" b="0" i="1" smtClean="0">
+                                              <a:latin typeface="Cambria Math"/>
+                                            </a:rPr>
+                                          </m:ctrlPr>
+                                        </m:sSubPr>
+                                        <m:e>
+                                          <m:r>
+                                            <a:rPr lang="en-US" sz="2500" b="0" i="1" smtClean="0">
+                                              <a:latin typeface="Cambria Math"/>
+                                            </a:rPr>
+                                            <m:t>𝐻</m:t>
+                                          </m:r>
+                                        </m:e>
+                                        <m:sub>
+                                          <m:r>
+                                            <a:rPr lang="en-US" sz="2500" b="0" i="1" smtClean="0">
+                                              <a:latin typeface="Cambria Math"/>
+                                            </a:rPr>
+                                            <m:t>9</m:t>
+                                          </m:r>
+                                        </m:sub>
+                                      </m:sSub>
+                                    </m:e>
+                                  </m:mr>
+                                </m:m>
+                              </m:e>
+                            </m:mr>
+                          </m:m>
+                        </m:e>
+                      </m:d>
                     </m:oMath>
                   </m:oMathPara>
                 </a14:m>
@@ -7697,12 +8117,329 @@
                   <a:rPr lang="en-US" sz="2500" dirty="0" smtClean="0"/>
                   <a:t> are the red square corners in real world. </a:t>
                 </a:r>
+              </a:p>
+              <a:p>
+                <a:pPr marL="0" indent="0">
+                  <a:buNone/>
+                </a:pPr>
+                <a:endParaRPr lang="en-US" sz="2500" dirty="0"/>
+              </a:p>
+              <a:p>
+                <a:pPr marL="0" indent="0">
+                  <a:buNone/>
+                </a:pPr>
+                <a14:m>
+                  <m:oMathPara xmlns:m="http://schemas.openxmlformats.org/officeDocument/2006/math">
+                    <m:oMathParaPr>
+                      <m:jc m:val="centerGroup"/>
+                    </m:oMathParaPr>
+                    <m:oMath xmlns:m="http://schemas.openxmlformats.org/officeDocument/2006/math">
+                      <m:r>
+                        <a:rPr lang="en-US" sz="2500" b="0" i="1" smtClean="0">
+                          <a:latin typeface="Cambria Math"/>
+                        </a:rPr>
+                        <m:t>𝐻</m:t>
+                      </m:r>
+                      <m:r>
+                        <a:rPr lang="en-US" sz="2500" b="0" i="1" smtClean="0">
+                          <a:latin typeface="Cambria Math"/>
+                        </a:rPr>
+                        <m:t>=</m:t>
+                      </m:r>
+                      <m:d>
+                        <m:dPr>
+                          <m:begChr m:val="["/>
+                          <m:endChr m:val="]"/>
+                          <m:ctrlPr>
+                            <a:rPr lang="en-US" sz="2500" b="0" i="1" smtClean="0">
+                              <a:latin typeface="Cambria Math"/>
+                            </a:rPr>
+                          </m:ctrlPr>
+                        </m:dPr>
+                        <m:e>
+                          <m:m>
+                            <m:mPr>
+                              <m:mcs>
+                                <m:mc>
+                                  <m:mcPr>
+                                    <m:count m:val="3"/>
+                                    <m:mcJc m:val="center"/>
+                                  </m:mcPr>
+                                </m:mc>
+                              </m:mcs>
+                              <m:ctrlPr>
+                                <a:rPr lang="en-US" sz="2500" b="0" i="1" smtClean="0">
+                                  <a:latin typeface="Cambria Math"/>
+                                </a:rPr>
+                              </m:ctrlPr>
+                            </m:mPr>
+                            <m:mr>
+                              <m:e>
+                                <m:sSub>
+                                  <m:sSubPr>
+                                    <m:ctrlPr>
+                                      <a:rPr lang="en-US" sz="2500" b="0" i="1" smtClean="0">
+                                        <a:latin typeface="Cambria Math"/>
+                                      </a:rPr>
+                                    </m:ctrlPr>
+                                  </m:sSubPr>
+                                  <m:e>
+                                    <m:r>
+                                      <m:rPr>
+                                        <m:brk m:alnAt="7"/>
+                                      </m:rPr>
+                                      <a:rPr lang="en-US" sz="2500" b="0" i="1" smtClean="0">
+                                        <a:latin typeface="Cambria Math"/>
+                                      </a:rPr>
+                                      <m:t>𝐻</m:t>
+                                    </m:r>
+                                  </m:e>
+                                  <m:sub>
+                                    <m:r>
+                                      <m:rPr>
+                                        <m:brk m:alnAt="7"/>
+                                      </m:rPr>
+                                      <a:rPr lang="en-US" sz="2500" b="0" i="1" smtClean="0">
+                                        <a:latin typeface="Cambria Math"/>
+                                      </a:rPr>
+                                      <m:t>1</m:t>
+                                    </m:r>
+                                  </m:sub>
+                                </m:sSub>
+                              </m:e>
+                              <m:e>
+                                <m:sSub>
+                                  <m:sSubPr>
+                                    <m:ctrlPr>
+                                      <a:rPr lang="en-US" sz="2500" b="0" i="1" smtClean="0">
+                                        <a:latin typeface="Cambria Math"/>
+                                      </a:rPr>
+                                    </m:ctrlPr>
+                                  </m:sSubPr>
+                                  <m:e>
+                                    <m:r>
+                                      <a:rPr lang="en-US" sz="2500" b="0" i="1" smtClean="0">
+                                        <a:latin typeface="Cambria Math"/>
+                                      </a:rPr>
+                                      <m:t>𝐻</m:t>
+                                    </m:r>
+                                  </m:e>
+                                  <m:sub>
+                                    <m:r>
+                                      <a:rPr lang="en-US" sz="2500" b="0" i="1" smtClean="0">
+                                        <a:latin typeface="Cambria Math"/>
+                                      </a:rPr>
+                                      <m:t>2</m:t>
+                                    </m:r>
+                                  </m:sub>
+                                </m:sSub>
+                              </m:e>
+                              <m:e>
+                                <m:sSub>
+                                  <m:sSubPr>
+                                    <m:ctrlPr>
+                                      <a:rPr lang="en-US" sz="2500" b="0" i="1" smtClean="0">
+                                        <a:latin typeface="Cambria Math"/>
+                                      </a:rPr>
+                                    </m:ctrlPr>
+                                  </m:sSubPr>
+                                  <m:e>
+                                    <m:r>
+                                      <a:rPr lang="en-US" sz="2500" b="0" i="1" smtClean="0">
+                                        <a:latin typeface="Cambria Math"/>
+                                      </a:rPr>
+                                      <m:t>𝐻</m:t>
+                                    </m:r>
+                                  </m:e>
+                                  <m:sub>
+                                    <m:r>
+                                      <a:rPr lang="en-US" sz="2500" b="0" i="1" smtClean="0">
+                                        <a:latin typeface="Cambria Math"/>
+                                      </a:rPr>
+                                      <m:t>3</m:t>
+                                    </m:r>
+                                  </m:sub>
+                                </m:sSub>
+                              </m:e>
+                            </m:mr>
+                            <m:mr>
+                              <m:e>
+                                <m:sSub>
+                                  <m:sSubPr>
+                                    <m:ctrlPr>
+                                      <a:rPr lang="en-US" sz="2500" b="0" i="1" smtClean="0">
+                                        <a:latin typeface="Cambria Math"/>
+                                      </a:rPr>
+                                    </m:ctrlPr>
+                                  </m:sSubPr>
+                                  <m:e>
+                                    <m:r>
+                                      <a:rPr lang="en-US" sz="2500" b="0" i="1" smtClean="0">
+                                        <a:latin typeface="Cambria Math"/>
+                                      </a:rPr>
+                                      <m:t>𝐻</m:t>
+                                    </m:r>
+                                  </m:e>
+                                  <m:sub>
+                                    <m:r>
+                                      <a:rPr lang="en-US" sz="2500" b="0" i="1" smtClean="0">
+                                        <a:latin typeface="Cambria Math"/>
+                                      </a:rPr>
+                                      <m:t>4</m:t>
+                                    </m:r>
+                                  </m:sub>
+                                </m:sSub>
+                              </m:e>
+                              <m:e>
+                                <m:sSub>
+                                  <m:sSubPr>
+                                    <m:ctrlPr>
+                                      <a:rPr lang="en-US" sz="2500" b="0" i="1" smtClean="0">
+                                        <a:latin typeface="Cambria Math"/>
+                                      </a:rPr>
+                                    </m:ctrlPr>
+                                  </m:sSubPr>
+                                  <m:e>
+                                    <m:r>
+                                      <a:rPr lang="en-US" sz="2500" b="0" i="1" smtClean="0">
+                                        <a:latin typeface="Cambria Math"/>
+                                      </a:rPr>
+                                      <m:t>𝐻</m:t>
+                                    </m:r>
+                                  </m:e>
+                                  <m:sub>
+                                    <m:r>
+                                      <a:rPr lang="en-US" sz="2500" b="0" i="1" smtClean="0">
+                                        <a:latin typeface="Cambria Math"/>
+                                      </a:rPr>
+                                      <m:t>5</m:t>
+                                    </m:r>
+                                  </m:sub>
+                                </m:sSub>
+                              </m:e>
+                              <m:e>
+                                <m:sSub>
+                                  <m:sSubPr>
+                                    <m:ctrlPr>
+                                      <a:rPr lang="en-US" sz="2500" b="0" i="1" smtClean="0">
+                                        <a:latin typeface="Cambria Math"/>
+                                      </a:rPr>
+                                    </m:ctrlPr>
+                                  </m:sSubPr>
+                                  <m:e>
+                                    <m:r>
+                                      <a:rPr lang="en-US" sz="2500" b="0" i="1" smtClean="0">
+                                        <a:latin typeface="Cambria Math"/>
+                                      </a:rPr>
+                                      <m:t>𝐻</m:t>
+                                    </m:r>
+                                  </m:e>
+                                  <m:sub>
+                                    <m:r>
+                                      <a:rPr lang="en-US" sz="2500" b="0" i="1" smtClean="0">
+                                        <a:latin typeface="Cambria Math"/>
+                                      </a:rPr>
+                                      <m:t>6</m:t>
+                                    </m:r>
+                                  </m:sub>
+                                </m:sSub>
+                              </m:e>
+                            </m:mr>
+                            <m:mr>
+                              <m:e>
+                                <m:sSub>
+                                  <m:sSubPr>
+                                    <m:ctrlPr>
+                                      <a:rPr lang="en-US" sz="2500" b="0" i="1" smtClean="0">
+                                        <a:latin typeface="Cambria Math"/>
+                                      </a:rPr>
+                                    </m:ctrlPr>
+                                  </m:sSubPr>
+                                  <m:e>
+                                    <m:r>
+                                      <a:rPr lang="en-US" sz="2500" b="0" i="1" smtClean="0">
+                                        <a:latin typeface="Cambria Math"/>
+                                      </a:rPr>
+                                      <m:t>𝐻</m:t>
+                                    </m:r>
+                                  </m:e>
+                                  <m:sub>
+                                    <m:r>
+                                      <a:rPr lang="en-US" sz="2500" b="0" i="1" smtClean="0">
+                                        <a:latin typeface="Cambria Math"/>
+                                      </a:rPr>
+                                      <m:t>7</m:t>
+                                    </m:r>
+                                  </m:sub>
+                                </m:sSub>
+                              </m:e>
+                              <m:e>
+                                <m:sSub>
+                                  <m:sSubPr>
+                                    <m:ctrlPr>
+                                      <a:rPr lang="en-US" sz="2500" b="0" i="1" smtClean="0">
+                                        <a:latin typeface="Cambria Math"/>
+                                      </a:rPr>
+                                    </m:ctrlPr>
+                                  </m:sSubPr>
+                                  <m:e>
+                                    <m:r>
+                                      <a:rPr lang="en-US" sz="2500" b="0" i="1" smtClean="0">
+                                        <a:latin typeface="Cambria Math"/>
+                                      </a:rPr>
+                                      <m:t>𝐻</m:t>
+                                    </m:r>
+                                  </m:e>
+                                  <m:sub>
+                                    <m:r>
+                                      <a:rPr lang="en-US" sz="2500" b="0" i="1" smtClean="0">
+                                        <a:latin typeface="Cambria Math"/>
+                                      </a:rPr>
+                                      <m:t>8</m:t>
+                                    </m:r>
+                                  </m:sub>
+                                </m:sSub>
+                              </m:e>
+                              <m:e>
+                                <m:sSub>
+                                  <m:sSubPr>
+                                    <m:ctrlPr>
+                                      <a:rPr lang="en-US" sz="2500" b="0" i="1" smtClean="0">
+                                        <a:latin typeface="Cambria Math"/>
+                                      </a:rPr>
+                                    </m:ctrlPr>
+                                  </m:sSubPr>
+                                  <m:e>
+                                    <m:r>
+                                      <a:rPr lang="en-US" sz="2500" b="0" i="1" smtClean="0">
+                                        <a:latin typeface="Cambria Math"/>
+                                      </a:rPr>
+                                      <m:t>𝐻</m:t>
+                                    </m:r>
+                                  </m:e>
+                                  <m:sub>
+                                    <m:r>
+                                      <a:rPr lang="en-US" sz="2500" b="0" i="1" smtClean="0">
+                                        <a:latin typeface="Cambria Math"/>
+                                      </a:rPr>
+                                      <m:t>9</m:t>
+                                    </m:r>
+                                  </m:sub>
+                                </m:sSub>
+                              </m:e>
+                            </m:mr>
+                          </m:m>
+                        </m:e>
+                      </m:d>
+                    </m:oMath>
+                  </m:oMathPara>
+                </a14:m>
                 <a:endParaRPr lang="en-US" sz="2500" dirty="0"/>
               </a:p>
             </p:txBody>
           </p:sp>
         </mc:Choice>
-        <mc:Fallback>
+        <mc:Fallback xmlns="">
           <p:sp>
             <p:nvSpPr>
               <p:cNvPr id="3" name="Content Placeholder 2"/>
@@ -7717,7 +8454,7 @@
               <a:blipFill rotWithShape="1">
                 <a:blip r:embed="rId3"/>
                 <a:stretch>
-                  <a:fillRect l="-905" t="-1752" r="-151"/>
+                  <a:fillRect l="-452" t="-1348"/>
                 </a:stretch>
               </a:blipFill>
             </p:spPr>
@@ -7818,6 +8555,73 @@
           </a:extLst>
         </p:spPr>
       </p:pic>
+      <p:cxnSp>
+        <p:nvCxnSpPr>
+          <p:cNvPr id="7" name="Straight Arrow Connector 6"/>
+          <p:cNvCxnSpPr/>
+          <p:nvPr/>
+        </p:nvCxnSpPr>
+        <p:spPr>
+          <a:xfrm>
+            <a:off x="5715000" y="1752600"/>
+            <a:ext cx="0" cy="4495800"/>
+          </a:xfrm>
+          <a:prstGeom prst="straightConnector1">
+            <a:avLst/>
+          </a:prstGeom>
+          <a:ln w="38100">
+            <a:tailEnd type="arrow"/>
+          </a:ln>
+        </p:spPr>
+        <p:style>
+          <a:lnRef idx="1">
+            <a:schemeClr val="dk1"/>
+          </a:lnRef>
+          <a:fillRef idx="0">
+            <a:schemeClr val="dk1"/>
+          </a:fillRef>
+          <a:effectRef idx="0">
+            <a:schemeClr val="dk1"/>
+          </a:effectRef>
+          <a:fontRef idx="minor">
+            <a:schemeClr val="tx1"/>
+          </a:fontRef>
+        </p:style>
+      </p:cxnSp>
+      <p:sp>
+        <p:nvSpPr>
+          <p:cNvPr id="8" name="TextBox 7"/>
+          <p:cNvSpPr txBox="1"/>
+          <p:nvPr/>
+        </p:nvSpPr>
+        <p:spPr>
+          <a:xfrm>
+            <a:off x="4800600" y="3657600"/>
+            <a:ext cx="990600" cy="430887"/>
+          </a:xfrm>
+          <a:prstGeom prst="rect">
+            <a:avLst/>
+          </a:prstGeom>
+          <a:noFill/>
+        </p:spPr>
+        <p:txBody>
+          <a:bodyPr wrap="square" rtlCol="0">
+            <a:spAutoFit/>
+          </a:bodyPr>
+          <a:lstStyle/>
+          <a:p>
+            <a:r>
+              <a:rPr lang="en-US" sz="1100" dirty="0" err="1" smtClean="0"/>
+              <a:t>Homography</a:t>
+            </a:r>
+            <a:r>
+              <a:rPr lang="en-US" sz="1100" dirty="0" smtClean="0"/>
+              <a:t> Transform</a:t>
+            </a:r>
+            <a:endParaRPr lang="en-US" sz="1100" dirty="0"/>
+          </a:p>
+        </p:txBody>
+      </p:sp>
     </p:spTree>
     <p:extLst>
       <p:ext uri="{BB962C8B-B14F-4D97-AF65-F5344CB8AC3E}">
@@ -7878,76 +8682,257 @@
           </a:p>
         </p:txBody>
       </p:sp>
-      <p:sp>
-        <p:nvSpPr>
-          <p:cNvPr id="5" name="Content Placeholder 4"/>
-          <p:cNvSpPr>
-            <a:spLocks noGrp="1"/>
-          </p:cNvSpPr>
-          <p:nvPr>
-            <p:ph idx="1"/>
-          </p:nvPr>
-        </p:nvSpPr>
-        <p:spPr>
-          <a:xfrm>
-            <a:off x="4419600" y="1600200"/>
-            <a:ext cx="4267200" cy="4525963"/>
-          </a:xfrm>
-        </p:spPr>
-        <p:txBody>
-          <a:bodyPr>
-            <a:noAutofit/>
-          </a:bodyPr>
-          <a:lstStyle/>
-          <a:p>
-            <a:r>
-              <a:rPr lang="en-US" sz="1800" b="1" dirty="0" smtClean="0"/>
-              <a:t>Recover first 2 columns of R and t = -RC by multiplying the inverse of K with H.</a:t>
-            </a:r>
-          </a:p>
-          <a:p>
-            <a:r>
-              <a:rPr lang="en-US" sz="1800" b="1" dirty="0" smtClean="0"/>
-              <a:t>Get the 3</a:t>
-            </a:r>
-            <a:r>
-              <a:rPr lang="en-US" sz="1800" b="1" baseline="30000" dirty="0" smtClean="0"/>
-              <a:t>rd</a:t>
-            </a:r>
-            <a:r>
-              <a:rPr lang="en-US" sz="1800" b="1" dirty="0" smtClean="0"/>
-              <a:t> column of R by finding the cross product of the first two columns.</a:t>
-            </a:r>
-          </a:p>
-          <a:p>
-            <a:r>
-              <a:rPr lang="en-US" sz="1800" b="1" dirty="0" smtClean="0"/>
-              <a:t>Find C by multiplying the inverse of R by t, then negating the result.</a:t>
-            </a:r>
-          </a:p>
-          <a:p>
-            <a:r>
-              <a:rPr lang="en-US" sz="1800" b="1" dirty="0" smtClean="0"/>
-              <a:t>Magnitude of C = the straight distance from the </a:t>
-            </a:r>
-            <a:r>
-              <a:rPr lang="en-US" sz="1800" b="1" dirty="0"/>
-              <a:t>camera center to the center of the square.</a:t>
-            </a:r>
-            <a:endParaRPr lang="en-US" sz="1800" b="1" dirty="0">
-              <a:solidFill>
-                <a:srgbClr val="FF0000"/>
-              </a:solidFill>
-            </a:endParaRPr>
-          </a:p>
-          <a:p>
-            <a:r>
-              <a:rPr lang="en-US" sz="1800" b="1" dirty="0" smtClean="0"/>
-              <a:t>Multiply R by &lt;0, 0, -1&gt;, and multiply R by &lt;0, 1, 0&gt; to find the rotation.</a:t>
-            </a:r>
-          </a:p>
-        </p:txBody>
-      </p:sp>
+      <mc:AlternateContent xmlns:mc="http://schemas.openxmlformats.org/markup-compatibility/2006" xmlns:a14="http://schemas.microsoft.com/office/drawing/2010/main">
+        <mc:Choice Requires="a14">
+          <p:sp>
+            <p:nvSpPr>
+              <p:cNvPr id="5" name="Content Placeholder 4"/>
+              <p:cNvSpPr>
+                <a:spLocks noGrp="1"/>
+              </p:cNvSpPr>
+              <p:nvPr>
+                <p:ph idx="1"/>
+              </p:nvPr>
+            </p:nvSpPr>
+            <p:spPr>
+              <a:xfrm>
+                <a:off x="4419600" y="1600200"/>
+                <a:ext cx="4267200" cy="4525963"/>
+              </a:xfrm>
+            </p:spPr>
+            <p:txBody>
+              <a:bodyPr>
+                <a:noAutofit/>
+              </a:bodyPr>
+              <a:lstStyle/>
+              <a:p>
+                <a:r>
+                  <a:rPr lang="en-US" sz="1800" b="1" dirty="0" smtClean="0"/>
+                  <a:t>Recover </a:t>
+                </a:r>
+                <a14:m>
+                  <m:oMath xmlns:m="http://schemas.openxmlformats.org/officeDocument/2006/math">
+                    <m:sSub>
+                      <m:sSubPr>
+                        <m:ctrlPr>
+                          <a:rPr lang="en-US" sz="1800" b="1" i="1" smtClean="0">
+                            <a:latin typeface="Cambria Math"/>
+                          </a:rPr>
+                        </m:ctrlPr>
+                      </m:sSubPr>
+                      <m:e>
+                        <m:r>
+                          <a:rPr lang="en-US" sz="1800" b="1" i="1" smtClean="0">
+                            <a:latin typeface="Cambria Math"/>
+                          </a:rPr>
+                          <m:t>𝒓</m:t>
+                        </m:r>
+                      </m:e>
+                      <m:sub>
+                        <m:r>
+                          <a:rPr lang="en-US" sz="1800" b="1" i="1" smtClean="0">
+                            <a:latin typeface="Cambria Math"/>
+                          </a:rPr>
+                          <m:t>𝟏</m:t>
+                        </m:r>
+                      </m:sub>
+                    </m:sSub>
+                    <m:r>
+                      <a:rPr lang="en-US" sz="1800" b="1" i="1" smtClean="0">
+                        <a:latin typeface="Cambria Math"/>
+                      </a:rPr>
+                      <m:t>, </m:t>
+                    </m:r>
+                    <m:sSub>
+                      <m:sSubPr>
+                        <m:ctrlPr>
+                          <a:rPr lang="en-US" sz="1800" b="1" i="1" smtClean="0">
+                            <a:latin typeface="Cambria Math"/>
+                          </a:rPr>
+                        </m:ctrlPr>
+                      </m:sSubPr>
+                      <m:e>
+                        <m:r>
+                          <a:rPr lang="en-US" sz="1800" b="1" i="1" smtClean="0">
+                            <a:latin typeface="Cambria Math"/>
+                          </a:rPr>
+                          <m:t>𝒓</m:t>
+                        </m:r>
+                      </m:e>
+                      <m:sub>
+                        <m:r>
+                          <a:rPr lang="en-US" sz="1800" b="1" i="1" smtClean="0">
+                            <a:latin typeface="Cambria Math"/>
+                          </a:rPr>
+                          <m:t>𝟐</m:t>
+                        </m:r>
+                      </m:sub>
+                    </m:sSub>
+                  </m:oMath>
+                </a14:m>
+                <a:r>
+                  <a:rPr lang="en-US" sz="1800" b="1" dirty="0" smtClean="0"/>
+                  <a:t> and t = -RC by multiplying the inverse of K with H.</a:t>
+                </a:r>
+              </a:p>
+              <a:p>
+                <a:r>
+                  <a:rPr lang="en-US" sz="1800" b="1" dirty="0" smtClean="0"/>
+                  <a:t>Get the </a:t>
+                </a:r>
+                <a14:m>
+                  <m:oMath xmlns:m="http://schemas.openxmlformats.org/officeDocument/2006/math">
+                    <m:sSub>
+                      <m:sSubPr>
+                        <m:ctrlPr>
+                          <a:rPr lang="en-US" sz="1800" b="1" i="1" smtClean="0">
+                            <a:latin typeface="Cambria Math"/>
+                          </a:rPr>
+                        </m:ctrlPr>
+                      </m:sSubPr>
+                      <m:e>
+                        <m:r>
+                          <a:rPr lang="en-US" sz="1800" b="1" i="1" smtClean="0">
+                            <a:latin typeface="Cambria Math"/>
+                          </a:rPr>
+                          <m:t>𝒓</m:t>
+                        </m:r>
+                      </m:e>
+                      <m:sub>
+                        <m:r>
+                          <a:rPr lang="en-US" sz="1800" b="1" i="1" smtClean="0">
+                            <a:latin typeface="Cambria Math"/>
+                          </a:rPr>
+                          <m:t>𝟑</m:t>
+                        </m:r>
+                      </m:sub>
+                    </m:sSub>
+                  </m:oMath>
+                </a14:m>
+                <a:r>
+                  <a:rPr lang="en-US" sz="1800" b="1" dirty="0" smtClean="0"/>
+                  <a:t> by finding the cross product of </a:t>
+                </a:r>
+                <a14:m>
+                  <m:oMath xmlns:m="http://schemas.openxmlformats.org/officeDocument/2006/math">
+                    <m:sSub>
+                      <m:sSubPr>
+                        <m:ctrlPr>
+                          <a:rPr lang="en-US" sz="1800" b="1" i="1" smtClean="0">
+                            <a:latin typeface="Cambria Math"/>
+                          </a:rPr>
+                        </m:ctrlPr>
+                      </m:sSubPr>
+                      <m:e>
+                        <m:r>
+                          <a:rPr lang="en-US" sz="1800" b="1" i="1" smtClean="0">
+                            <a:latin typeface="Cambria Math"/>
+                          </a:rPr>
+                          <m:t>𝒓</m:t>
+                        </m:r>
+                      </m:e>
+                      <m:sub>
+                        <m:r>
+                          <a:rPr lang="en-US" sz="1800" b="1" i="1" smtClean="0">
+                            <a:latin typeface="Cambria Math"/>
+                          </a:rPr>
+                          <m:t>𝟏</m:t>
+                        </m:r>
+                      </m:sub>
+                    </m:sSub>
+                  </m:oMath>
+                </a14:m>
+                <a:r>
+                  <a:rPr lang="en-US" sz="1800" b="1" dirty="0" smtClean="0"/>
+                  <a:t> and </a:t>
+                </a:r>
+                <a14:m>
+                  <m:oMath xmlns:m="http://schemas.openxmlformats.org/officeDocument/2006/math">
+                    <m:sSub>
+                      <m:sSubPr>
+                        <m:ctrlPr>
+                          <a:rPr lang="en-US" sz="1800" b="1" i="1" smtClean="0">
+                            <a:latin typeface="Cambria Math"/>
+                          </a:rPr>
+                        </m:ctrlPr>
+                      </m:sSubPr>
+                      <m:e>
+                        <m:r>
+                          <a:rPr lang="en-US" sz="1800" b="1" i="1" smtClean="0">
+                            <a:latin typeface="Cambria Math"/>
+                          </a:rPr>
+                          <m:t>𝒓</m:t>
+                        </m:r>
+                      </m:e>
+                      <m:sub>
+                        <m:r>
+                          <a:rPr lang="en-US" sz="1800" b="1" i="1" smtClean="0">
+                            <a:latin typeface="Cambria Math"/>
+                          </a:rPr>
+                          <m:t>𝟐</m:t>
+                        </m:r>
+                      </m:sub>
+                    </m:sSub>
+                  </m:oMath>
+                </a14:m>
+                <a:r>
+                  <a:rPr lang="en-US" sz="1800" b="1" dirty="0" smtClean="0"/>
+                  <a:t>.</a:t>
+                </a:r>
+              </a:p>
+              <a:p>
+                <a:r>
+                  <a:rPr lang="en-US" sz="1800" b="1" dirty="0" smtClean="0"/>
+                  <a:t>Find C by multiplying the inverse of R by t, then negating the result.</a:t>
+                </a:r>
+              </a:p>
+              <a:p>
+                <a:r>
+                  <a:rPr lang="en-US" sz="1800" b="1" dirty="0" smtClean="0"/>
+                  <a:t>Multiply R by &lt;0, 0, -1&gt;, and multiply R by &lt;0, 1, 0&gt; to find the rotation.</a:t>
+                </a:r>
+              </a:p>
+            </p:txBody>
+          </p:sp>
+        </mc:Choice>
+        <mc:Fallback xmlns="">
+          <p:sp>
+            <p:nvSpPr>
+              <p:cNvPr id="5" name="Content Placeholder 4"/>
+              <p:cNvSpPr>
+                <a:spLocks noGrp="1" noRot="1" noChangeAspect="1" noMove="1" noResize="1" noEditPoints="1" noAdjustHandles="1" noChangeArrowheads="1" noChangeShapeType="1" noTextEdit="1"/>
+              </p:cNvSpPr>
+              <p:nvPr>
+                <p:ph idx="1"/>
+              </p:nvPr>
+            </p:nvSpPr>
+            <p:spPr>
+              <a:xfrm>
+                <a:off x="4419600" y="1600200"/>
+                <a:ext cx="4267200" cy="4525963"/>
+              </a:xfrm>
+              <a:blipFill rotWithShape="1">
+                <a:blip r:embed="rId2"/>
+                <a:stretch>
+                  <a:fillRect l="-857" t="-674" r="-714"/>
+                </a:stretch>
+              </a:blipFill>
+            </p:spPr>
+            <p:txBody>
+              <a:bodyPr/>
+              <a:lstStyle/>
+              <a:p>
+                <a:r>
+                  <a:rPr lang="en-US">
+                    <a:noFill/>
+                  </a:rPr>
+                  <a:t> </a:t>
+                </a:r>
+              </a:p>
+            </p:txBody>
+          </p:sp>
+        </mc:Fallback>
+      </mc:AlternateContent>
       <p:grpSp>
         <p:nvGrpSpPr>
           <p:cNvPr id="3" name="Group 2"/>
@@ -7956,7 +8941,7 @@
         </p:nvGrpSpPr>
         <p:grpSpPr>
           <a:xfrm>
-            <a:off x="252895" y="669798"/>
+            <a:off x="240899" y="1262115"/>
             <a:ext cx="3337009" cy="2735996"/>
             <a:chOff x="213271" y="1455003"/>
             <a:chExt cx="4799451" cy="3935045"/>
@@ -7971,7 +8956,7 @@
             <p:nvPr/>
           </p:nvPicPr>
           <p:blipFill>
-            <a:blip r:embed="rId2">
+            <a:blip r:embed="rId3">
               <a:extLst>
                 <a:ext uri="{28A0092B-C50C-407E-A947-70E740481C1C}">
                   <a14:useLocalDpi xmlns:a14="http://schemas.microsoft.com/office/drawing/2010/main" val="0"/>
@@ -8003,8 +8988,8 @@
             </a:extLst>
           </p:spPr>
         </p:pic>
-        <mc:AlternateContent xmlns:mc="http://schemas.openxmlformats.org/markup-compatibility/2006">
-          <mc:Choice xmlns:a14="http://schemas.microsoft.com/office/drawing/2010/main" Requires="a14">
+        <mc:AlternateContent xmlns:mc="http://schemas.openxmlformats.org/markup-compatibility/2006" xmlns:a14="http://schemas.microsoft.com/office/drawing/2010/main">
+          <mc:Choice Requires="a14">
             <p:sp>
               <p:nvSpPr>
                 <p:cNvPr id="6" name="TextBox 5"/>
@@ -8140,7 +9125,7 @@
               </p:txBody>
             </p:sp>
           </mc:Choice>
-          <mc:Fallback>
+          <mc:Fallback xmlns="">
             <p:sp>
               <p:nvSpPr>
                 <p:cNvPr id="6" name="TextBox 5"/>
@@ -8158,7 +9143,7 @@
                   <a:avLst/>
                 </a:prstGeom>
                 <a:blipFill rotWithShape="1">
-                  <a:blip r:embed="rId3"/>
+                  <a:blip r:embed="rId4"/>
                   <a:stretch>
                     <a:fillRect r="-866" b="-8537"/>
                   </a:stretch>
@@ -8188,7 +9173,7 @@
             <p:nvPr/>
           </p:nvPicPr>
           <p:blipFill>
-            <a:blip r:embed="rId4">
+            <a:blip r:embed="rId5">
               <a:extLst>
                 <a:ext uri="{28A0092B-C50C-407E-A947-70E740481C1C}">
                   <a14:useLocalDpi xmlns:a14="http://schemas.microsoft.com/office/drawing/2010/main" val="0"/>
@@ -8220,8 +9205,8 @@
             </a:extLst>
           </p:spPr>
         </p:pic>
-        <mc:AlternateContent xmlns:mc="http://schemas.openxmlformats.org/markup-compatibility/2006">
-          <mc:Choice xmlns:a14="http://schemas.microsoft.com/office/drawing/2010/main" Requires="a14">
+        <mc:AlternateContent xmlns:mc="http://schemas.openxmlformats.org/markup-compatibility/2006" xmlns:a14="http://schemas.microsoft.com/office/drawing/2010/main">
+          <mc:Choice Requires="a14">
             <p:sp>
               <p:nvSpPr>
                 <p:cNvPr id="8" name="Rectangle 7"/>
@@ -8295,7 +9280,7 @@
               </p:txBody>
             </p:sp>
           </mc:Choice>
-          <mc:Fallback>
+          <mc:Fallback xmlns="">
             <p:sp>
               <p:nvSpPr>
                 <p:cNvPr id="8" name="Rectangle 7"/>
@@ -8313,7 +9298,7 @@
                   <a:avLst/>
                 </a:prstGeom>
                 <a:blipFill rotWithShape="1">
-                  <a:blip r:embed="rId5"/>
+                  <a:blip r:embed="rId6"/>
                   <a:stretch>
                     <a:fillRect/>
                   </a:stretch>
@@ -8335,8 +9320,8 @@
           </mc:Fallback>
         </mc:AlternateContent>
       </p:grpSp>
-      <mc:AlternateContent xmlns:mc="http://schemas.openxmlformats.org/markup-compatibility/2006">
-        <mc:Choice xmlns:a14="http://schemas.microsoft.com/office/drawing/2010/main" Requires="a14">
+      <mc:AlternateContent xmlns:mc="http://schemas.openxmlformats.org/markup-compatibility/2006" xmlns:a14="http://schemas.microsoft.com/office/drawing/2010/main">
+        <mc:Choice Requires="a14">
           <p:sp>
             <p:nvSpPr>
               <p:cNvPr id="13" name="TextBox 12"/>
@@ -8345,8 +9330,8 @@
             </p:nvSpPr>
             <p:spPr>
               <a:xfrm>
-                <a:off x="422496" y="3405794"/>
-                <a:ext cx="3844704" cy="2308324"/>
+                <a:off x="447496" y="4267200"/>
+                <a:ext cx="3844704" cy="2123658"/>
               </a:xfrm>
               <a:prstGeom prst="rect">
                 <a:avLst/>
@@ -8360,13 +9345,13 @@
               <a:lstStyle/>
               <a:p>
                 <a:r>
-                  <a:rPr lang="en-US" dirty="0" smtClean="0"/>
+                  <a:rPr lang="en-US" sz="1600" dirty="0" smtClean="0"/>
                   <a:t>K: Intrinsic Parameter of a Camera</a:t>
                 </a:r>
               </a:p>
               <a:p>
                 <a:r>
-                  <a:rPr lang="en-US" dirty="0" smtClean="0"/>
+                  <a:rPr lang="en-US" sz="1600" dirty="0" smtClean="0"/>
                   <a:t>R: Rotation of the camera (3x3)</a:t>
                 </a:r>
               </a:p>
@@ -8376,14 +9361,14 @@
                     <m:sSub>
                       <m:sSubPr>
                         <m:ctrlPr>
-                          <a:rPr lang="en-US" i="1">
+                          <a:rPr lang="en-US" sz="1600" i="1">
                             <a:latin typeface="Cambria Math"/>
                           </a:rPr>
                         </m:ctrlPr>
                       </m:sSubPr>
                       <m:e>
                         <m:r>
-                          <a:rPr lang="en-US" i="1">
+                          <a:rPr lang="en-US" sz="1600" i="1">
                             <a:latin typeface="Cambria Math"/>
                           </a:rPr>
                           <m:t>𝑟</m:t>
@@ -8391,7 +9376,7 @@
                       </m:e>
                       <m:sub>
                         <m:r>
-                          <a:rPr lang="en-US" i="1">
+                          <a:rPr lang="en-US" sz="1600" i="1">
                             <a:latin typeface="Cambria Math"/>
                           </a:rPr>
                           <m:t>1</m:t>
@@ -8399,7 +9384,7 @@
                       </m:sub>
                     </m:sSub>
                     <m:r>
-                      <a:rPr lang="en-US" i="1">
+                      <a:rPr lang="en-US" sz="1600" i="1">
                         <a:latin typeface="Cambria Math"/>
                       </a:rPr>
                       <m:t>, </m:t>
@@ -8407,14 +9392,14 @@
                     <m:sSub>
                       <m:sSubPr>
                         <m:ctrlPr>
-                          <a:rPr lang="en-US" i="1">
+                          <a:rPr lang="en-US" sz="1600" i="1">
                             <a:latin typeface="Cambria Math"/>
                           </a:rPr>
                         </m:ctrlPr>
                       </m:sSubPr>
                       <m:e>
                         <m:r>
-                          <a:rPr lang="en-US" i="1">
+                          <a:rPr lang="en-US" sz="1600" i="1">
                             <a:latin typeface="Cambria Math"/>
                           </a:rPr>
                           <m:t>𝑟</m:t>
@@ -8422,7 +9407,7 @@
                       </m:e>
                       <m:sub>
                         <m:r>
-                          <a:rPr lang="en-US" i="1">
+                          <a:rPr lang="en-US" sz="1600" i="1">
                             <a:latin typeface="Cambria Math"/>
                           </a:rPr>
                           <m:t>2</m:t>
@@ -8430,7 +9415,7 @@
                       </m:sub>
                     </m:sSub>
                     <m:r>
-                      <a:rPr lang="en-US" i="1">
+                      <a:rPr lang="en-US" sz="1600" i="1">
                         <a:latin typeface="Cambria Math"/>
                       </a:rPr>
                       <m:t>, </m:t>
@@ -8438,14 +9423,14 @@
                     <m:sSub>
                       <m:sSubPr>
                         <m:ctrlPr>
-                          <a:rPr lang="en-US" i="1">
+                          <a:rPr lang="en-US" sz="1600" i="1">
                             <a:latin typeface="Cambria Math"/>
                           </a:rPr>
                         </m:ctrlPr>
                       </m:sSubPr>
                       <m:e>
                         <m:r>
-                          <a:rPr lang="en-US" i="1">
+                          <a:rPr lang="en-US" sz="1600" i="1">
                             <a:latin typeface="Cambria Math"/>
                           </a:rPr>
                           <m:t>𝑟</m:t>
@@ -8453,7 +9438,7 @@
                       </m:e>
                       <m:sub>
                         <m:r>
-                          <a:rPr lang="en-US" i="1">
+                          <a:rPr lang="en-US" sz="1600" i="1">
                             <a:latin typeface="Cambria Math"/>
                           </a:rPr>
                           <m:t>3</m:t>
@@ -8463,46 +9448,46 @@
                   </m:oMath>
                 </a14:m>
                 <a:r>
-                  <a:rPr lang="en-US" dirty="0"/>
+                  <a:rPr lang="en-US" sz="1600" dirty="0"/>
                   <a:t>: columns of </a:t>
                 </a:r>
                 <a:r>
-                  <a:rPr lang="en-US" dirty="0" smtClean="0"/>
+                  <a:rPr lang="en-US" sz="1600" dirty="0" smtClean="0"/>
                   <a:t>R</a:t>
                 </a:r>
               </a:p>
               <a:p>
                 <a:r>
-                  <a:rPr lang="en-US" dirty="0" smtClean="0"/>
+                  <a:rPr lang="en-US" sz="1600" dirty="0" smtClean="0"/>
                   <a:t>C: Location of the camera in real-world coordinates (3x1)</a:t>
                 </a:r>
               </a:p>
               <a:p>
                 <a:r>
-                  <a:rPr lang="en-US" dirty="0" err="1" smtClean="0"/>
+                  <a:rPr lang="en-US" sz="1600" dirty="0" err="1" smtClean="0"/>
                   <a:t>x,y</a:t>
                 </a:r>
                 <a:r>
-                  <a:rPr lang="en-US" dirty="0" smtClean="0"/>
+                  <a:rPr lang="en-US" sz="1600" dirty="0" smtClean="0"/>
                   <a:t>: image coordinates</a:t>
                 </a:r>
               </a:p>
               <a:p>
                 <a:r>
-                  <a:rPr lang="en-US" dirty="0" smtClean="0"/>
+                  <a:rPr lang="en-US" sz="1600" dirty="0" smtClean="0"/>
                   <a:t>X, Y, Z: real-world coordinates</a:t>
                 </a:r>
               </a:p>
               <a:p>
                 <a:r>
-                  <a:rPr lang="en-US" dirty="0" smtClean="0"/>
+                  <a:rPr lang="en-US" sz="1600" dirty="0" smtClean="0"/>
                   <a:t>t = -RC (3x1)</a:t>
                 </a:r>
               </a:p>
             </p:txBody>
           </p:sp>
         </mc:Choice>
-        <mc:Fallback>
+        <mc:Fallback xmlns="">
           <p:sp>
             <p:nvSpPr>
               <p:cNvPr id="13" name="TextBox 12"/>
@@ -8513,16 +9498,16 @@
             </p:nvSpPr>
             <p:spPr>
               <a:xfrm>
-                <a:off x="422496" y="3405794"/>
-                <a:ext cx="3844704" cy="2308324"/>
+                <a:off x="447496" y="4267200"/>
+                <a:ext cx="3844704" cy="2123658"/>
               </a:xfrm>
               <a:prstGeom prst="rect">
                 <a:avLst/>
               </a:prstGeom>
               <a:blipFill rotWithShape="1">
-                <a:blip r:embed="rId6"/>
+                <a:blip r:embed="rId7"/>
                 <a:stretch>
-                  <a:fillRect l="-1268" t="-1323" r="-1268" b="-3439"/>
+                  <a:fillRect l="-792" t="-862"/>
                 </a:stretch>
               </a:blipFill>
             </p:spPr>
@@ -8541,6 +9526,60 @@
           </p:sp>
         </mc:Fallback>
       </mc:AlternateContent>
+      <p:pic>
+        <p:nvPicPr>
+          <p:cNvPr id="3074" name="Picture 2"/>
+          <p:cNvPicPr>
+            <a:picLocks noChangeAspect="1" noChangeArrowheads="1"/>
+          </p:cNvPicPr>
+          <p:nvPr/>
+        </p:nvPicPr>
+        <p:blipFill>
+          <a:blip r:embed="rId8">
+            <a:extLst>
+              <a:ext uri="{28A0092B-C50C-407E-A947-70E740481C1C}">
+                <a14:useLocalDpi xmlns:a14="http://schemas.microsoft.com/office/drawing/2010/main" val="0"/>
+              </a:ext>
+            </a:extLst>
+          </a:blip>
+          <a:srcRect/>
+          <a:stretch>
+            <a:fillRect/>
+          </a:stretch>
+        </p:blipFill>
+        <p:spPr bwMode="auto">
+          <a:xfrm>
+            <a:off x="5172075" y="4542894"/>
+            <a:ext cx="2286000" cy="1847964"/>
+          </a:xfrm>
+          <a:prstGeom prst="rect">
+            <a:avLst/>
+          </a:prstGeom>
+          <a:noFill/>
+          <a:ln>
+            <a:noFill/>
+          </a:ln>
+          <a:extLst>
+            <a:ext uri="{909E8E84-426E-40DD-AFC4-6F175D3DCCD1}">
+              <a14:hiddenFill xmlns:a14="http://schemas.microsoft.com/office/drawing/2010/main">
+                <a:solidFill>
+                  <a:schemeClr val="accent1"/>
+                </a:solidFill>
+              </a14:hiddenFill>
+            </a:ext>
+            <a:ext uri="{91240B29-F687-4F45-9708-019B960494DF}">
+              <a14:hiddenLine xmlns:a14="http://schemas.microsoft.com/office/drawing/2010/main" w="9525">
+                <a:solidFill>
+                  <a:schemeClr val="tx1"/>
+                </a:solidFill>
+                <a:miter lim="800000"/>
+                <a:headEnd/>
+                <a:tailEnd/>
+              </a14:hiddenLine>
+            </a:ext>
+          </a:extLst>
+        </p:spPr>
+      </p:pic>
     </p:spTree>
     <p:extLst>
       <p:ext uri="{BB962C8B-B14F-4D97-AF65-F5344CB8AC3E}">
@@ -8706,19 +9745,6 @@
           <a:p>
             <a:r>
               <a:rPr lang="en-US" dirty="0" smtClean="0"/>
-              <a:t>Accuracy</a:t>
-            </a:r>
-          </a:p>
-          <a:p>
-            <a:pPr lvl="1"/>
-            <a:r>
-              <a:rPr lang="en-US" dirty="0" smtClean="0"/>
-              <a:t>Can be improved by averaging</a:t>
-            </a:r>
-          </a:p>
-          <a:p>
-            <a:r>
-              <a:rPr lang="en-US" dirty="0" smtClean="0"/>
               <a:t>Use continuity of video stream to improve corner detection</a:t>
             </a:r>
             <a:endParaRPr lang="en-US" dirty="0"/>
@@ -8772,14 +9798,155 @@
             <p:ph type="title"/>
           </p:nvPr>
         </p:nvSpPr>
-        <p:spPr/>
+        <p:spPr>
+          <a:xfrm>
+            <a:off x="533400" y="1116013"/>
+            <a:ext cx="8229600" cy="865187"/>
+          </a:xfrm>
+        </p:spPr>
         <p:txBody>
           <a:bodyPr/>
           <a:lstStyle/>
           <a:p>
             <a:r>
               <a:rPr lang="en-US" dirty="0" smtClean="0"/>
-              <a:t>Questions?</a:t>
+              <a:t>Any Questions</a:t>
+            </a:r>
+            <a:r>
+              <a:rPr lang="en-US" dirty="0" smtClean="0"/>
+              <a:t>?</a:t>
+            </a:r>
+            <a:endParaRPr lang="en-US" dirty="0"/>
+          </a:p>
+        </p:txBody>
+      </p:sp>
+      <p:sp>
+        <p:nvSpPr>
+          <p:cNvPr id="3" name="Title 3"/>
+          <p:cNvSpPr txBox="1">
+            <a:spLocks/>
+          </p:cNvSpPr>
+          <p:nvPr/>
+        </p:nvSpPr>
+        <p:spPr>
+          <a:xfrm>
+            <a:off x="762000" y="381001"/>
+            <a:ext cx="7772400" cy="735012"/>
+          </a:xfrm>
+          <a:prstGeom prst="rect">
+            <a:avLst/>
+          </a:prstGeom>
+        </p:spPr>
+        <p:txBody>
+          <a:bodyPr vert="horz" lIns="91440" tIns="45720" rIns="91440" bIns="45720" rtlCol="0" anchor="ctr">
+            <a:normAutofit lnSpcReduction="10000"/>
+          </a:bodyPr>
+          <a:lstStyle>
+            <a:lvl1pPr algn="ctr" defTabSz="914400" rtl="0" eaLnBrk="1" latinLnBrk="0" hangingPunct="1">
+              <a:spcBef>
+                <a:spcPct val="0"/>
+              </a:spcBef>
+              <a:buNone/>
+              <a:defRPr sz="4400" kern="1200">
+                <a:solidFill>
+                  <a:schemeClr val="tx1"/>
+                </a:solidFill>
+                <a:latin typeface="+mj-lt"/>
+                <a:ea typeface="+mj-ea"/>
+                <a:cs typeface="+mj-cs"/>
+              </a:defRPr>
+            </a:lvl1pPr>
+          </a:lstStyle>
+          <a:p>
+            <a:r>
+              <a:rPr lang="en-US" dirty="0" smtClean="0"/>
+              <a:t>Thank You!</a:t>
+            </a:r>
+            <a:endParaRPr lang="en-US" dirty="0"/>
+          </a:p>
+        </p:txBody>
+      </p:sp>
+      <p:sp>
+        <p:nvSpPr>
+          <p:cNvPr id="4" name="TextBox 3"/>
+          <p:cNvSpPr txBox="1"/>
+          <p:nvPr/>
+        </p:nvSpPr>
+        <p:spPr>
+          <a:xfrm>
+            <a:off x="762000" y="2819400"/>
+            <a:ext cx="8001000" cy="1477328"/>
+          </a:xfrm>
+          <a:prstGeom prst="rect">
+            <a:avLst/>
+          </a:prstGeom>
+          <a:noFill/>
+        </p:spPr>
+        <p:txBody>
+          <a:bodyPr wrap="square" rtlCol="0">
+            <a:spAutoFit/>
+          </a:bodyPr>
+          <a:lstStyle/>
+          <a:p>
+            <a:r>
+              <a:rPr lang="en-US" dirty="0" err="1" smtClean="0"/>
+              <a:t>GitHub</a:t>
+            </a:r>
+            <a:r>
+              <a:rPr lang="en-US" dirty="0" smtClean="0"/>
+              <a:t> Repository: </a:t>
+            </a:r>
+            <a:r>
+              <a:rPr lang="en-US" dirty="0">
+                <a:hlinkClick r:id="rId2"/>
+              </a:rPr>
+              <a:t>https://</a:t>
+            </a:r>
+            <a:r>
+              <a:rPr lang="en-US" dirty="0" smtClean="0">
+                <a:hlinkClick r:id="rId2"/>
+              </a:rPr>
+              <a:t>github.com/lhr0909/MonoCameraRecovery</a:t>
+            </a:r>
+            <a:endParaRPr lang="en-US" dirty="0" smtClean="0"/>
+          </a:p>
+          <a:p>
+            <a:endParaRPr lang="en-US" dirty="0"/>
+          </a:p>
+          <a:p>
+            <a:r>
+              <a:rPr lang="en-US" dirty="0" err="1" smtClean="0"/>
+              <a:t>Youtube</a:t>
+            </a:r>
+            <a:r>
+              <a:rPr lang="en-US" dirty="0"/>
+              <a:t> </a:t>
+            </a:r>
+            <a:r>
+              <a:rPr lang="en-US" dirty="0" smtClean="0"/>
+              <a:t>Video of the demo: </a:t>
+            </a:r>
+            <a:r>
+              <a:rPr lang="en-US" dirty="0">
+                <a:hlinkClick r:id="rId3"/>
+              </a:rPr>
+              <a:t>http://</a:t>
+            </a:r>
+            <a:r>
+              <a:rPr lang="en-US" dirty="0" smtClean="0">
+                <a:hlinkClick r:id="rId3"/>
+              </a:rPr>
+              <a:t>youtu.be/wXrEu-Yz1ko</a:t>
+            </a:r>
+            <a:endParaRPr lang="en-US" dirty="0" smtClean="0"/>
+          </a:p>
+          <a:p>
+            <a:endParaRPr lang="en-US" dirty="0"/>
+          </a:p>
+          <a:p>
+            <a:r>
+              <a:rPr lang="en-US" dirty="0" smtClean="0"/>
+              <a:t>Presentation Slides and Final Report Available in the Repository</a:t>
             </a:r>
             <a:endParaRPr lang="en-US" dirty="0"/>
           </a:p>
@@ -8817,7 +9984,7 @@
       </p:grpSpPr>
       <p:sp>
         <p:nvSpPr>
-          <p:cNvPr id="4" name="Title 3"/>
+          <p:cNvPr id="2" name="Title 1"/>
           <p:cNvSpPr>
             <a:spLocks noGrp="1"/>
           </p:cNvSpPr>
@@ -8830,11 +9997,7 @@
           <a:bodyPr/>
           <a:lstStyle/>
           <a:p>
-            <a:r>
-              <a:rPr lang="en-US" dirty="0" smtClean="0"/>
-              <a:t>Thank You!</a:t>
-            </a:r>
-            <a:endParaRPr lang="en-US" dirty="0"/>
+            <a:endParaRPr lang="en-US"/>
           </a:p>
         </p:txBody>
       </p:sp>
@@ -8848,6 +10011,13 @@
   <p:clrMapOvr>
     <a:masterClrMapping/>
   </p:clrMapOvr>
+  <p:timing>
+    <p:tnLst>
+      <p:par>
+        <p:cTn id="1" dur="indefinite" restart="never" nodeType="tmRoot"/>
+      </p:par>
+    </p:tnLst>
+  </p:timing>
 </p:sld>
 </file>
 
@@ -8908,7 +10078,7 @@
           <a:p>
             <a:r>
               <a:rPr lang="en-US" dirty="0" smtClean="0"/>
-              <a:t>Math</a:t>
+              <a:t>Why it works</a:t>
             </a:r>
           </a:p>
           <a:p>
@@ -8926,7 +10096,7 @@
           <a:p>
             <a:r>
               <a:rPr lang="en-US" dirty="0" smtClean="0"/>
-              <a:t>Issues / Concerns</a:t>
+              <a:t>Future Improvements</a:t>
             </a:r>
           </a:p>
           <a:p>
@@ -8947,6 +10117,13 @@
   <p:clrMapOvr>
     <a:masterClrMapping/>
   </p:clrMapOvr>
+  <p:timing>
+    <p:tnLst>
+      <p:par>
+        <p:cTn id="1" dur="indefinite" restart="never" nodeType="tmRoot"/>
+      </p:par>
+    </p:tnLst>
+  </p:timing>
 </p:sld>
 </file>
 
@@ -8977,60 +10154,27 @@
             <p:ph type="title"/>
           </p:nvPr>
         </p:nvSpPr>
-        <p:spPr/>
+        <p:spPr>
+          <a:xfrm>
+            <a:off x="152400" y="76200"/>
+            <a:ext cx="8763000" cy="762000"/>
+          </a:xfrm>
+        </p:spPr>
         <p:txBody>
-          <a:bodyPr/>
+          <a:bodyPr lIns="0" tIns="0" rIns="0" bIns="0">
+            <a:noAutofit/>
+          </a:bodyPr>
           <a:lstStyle/>
           <a:p>
-            <a:r>
-              <a:rPr lang="en-US" dirty="0" smtClean="0"/>
-              <a:t>Math</a:t>
-            </a:r>
-            <a:endParaRPr lang="en-US" dirty="0"/>
+            <a:pPr algn="l"/>
+            <a:r>
+              <a:rPr lang="en-US" sz="2400" b="1" dirty="0" smtClean="0"/>
+              <a:t>If we know the size of the object and intrinsic properties of a camera, we can recover 3D information with just one camera</a:t>
+            </a:r>
+            <a:endParaRPr lang="en-US" sz="2400" b="1" dirty="0"/>
           </a:p>
         </p:txBody>
       </p:sp>
-      <p:pic>
-        <p:nvPicPr>
-          <p:cNvPr id="1026" name="Picture 2" descr="                               (        )&#10; (  x )          [           ]     X&#10;λ(  y ) =  [K |0 ]  R   - RC    ||   Y    || ,&#10;               3   0T3    1     (  Z = 0 )&#10;    1                               1&#10;"/>
-          <p:cNvPicPr>
-            <a:picLocks noChangeAspect="1" noChangeArrowheads="1"/>
-          </p:cNvPicPr>
-          <p:nvPr/>
-        </p:nvPicPr>
-        <p:blipFill>
-          <a:blip r:embed="rId3">
-            <a:extLst>
-              <a:ext uri="{28A0092B-C50C-407E-A947-70E740481C1C}">
-                <a14:useLocalDpi xmlns:a14="http://schemas.microsoft.com/office/drawing/2010/main" val="0"/>
-              </a:ext>
-            </a:extLst>
-          </a:blip>
-          <a:srcRect/>
-          <a:stretch>
-            <a:fillRect/>
-          </a:stretch>
-        </p:blipFill>
-        <p:spPr bwMode="auto">
-          <a:xfrm>
-            <a:off x="762000" y="2286000"/>
-            <a:ext cx="4555522" cy="1066801"/>
-          </a:xfrm>
-          <a:prstGeom prst="rect">
-            <a:avLst/>
-          </a:prstGeom>
-          <a:noFill/>
-          <a:extLst>
-            <a:ext uri="{909E8E84-426E-40DD-AFC4-6F175D3DCCD1}">
-              <a14:hiddenFill xmlns:a14="http://schemas.microsoft.com/office/drawing/2010/main">
-                <a:solidFill>
-                  <a:srgbClr val="FFFFFF"/>
-                </a:solidFill>
-              </a14:hiddenFill>
-            </a:ext>
-          </a:extLst>
-        </p:spPr>
-      </p:pic>
       <mc:AlternateContent xmlns:mc="http://schemas.openxmlformats.org/markup-compatibility/2006" xmlns:a14="http://schemas.microsoft.com/office/drawing/2010/main">
         <mc:Choice Requires="a14">
           <p:sp>
@@ -9041,7 +10185,7 @@
             </p:nvSpPr>
             <p:spPr>
               <a:xfrm>
-                <a:off x="685800" y="1447800"/>
+                <a:off x="838200" y="1371600"/>
                 <a:ext cx="2409378" cy="830997"/>
               </a:xfrm>
               <a:prstGeom prst="rect">
@@ -9179,16 +10323,16 @@
             </p:nvSpPr>
             <p:spPr>
               <a:xfrm>
-                <a:off x="685800" y="1447800"/>
+                <a:off x="838200" y="1371600"/>
                 <a:ext cx="2409378" cy="830997"/>
               </a:xfrm>
               <a:prstGeom prst="rect">
                 <a:avLst/>
               </a:prstGeom>
               <a:blipFill rotWithShape="1">
-                <a:blip r:embed="rId4"/>
+                <a:blip r:embed="rId3"/>
                 <a:stretch>
-                  <a:fillRect r="-253" b="-8824"/>
+                  <a:fillRect r="-253" b="-9559"/>
                 </a:stretch>
               </a:blipFill>
             </p:spPr>
@@ -9207,47 +10351,6 @@
           </p:sp>
         </mc:Fallback>
       </mc:AlternateContent>
-      <p:pic>
-        <p:nvPicPr>
-          <p:cNvPr id="1028" name="Picture 4" descr="  ( x )                       (  X  )&#10;λ ( y )  =     K [ r r  t ]   (  Y  ) ,&#10;               ◟---◝1◜-2--◞&#10;    1      homography transform H   1&#10;"/>
-          <p:cNvPicPr>
-            <a:picLocks noChangeAspect="1" noChangeArrowheads="1"/>
-          </p:cNvPicPr>
-          <p:nvPr/>
-        </p:nvPicPr>
-        <p:blipFill>
-          <a:blip r:embed="rId5">
-            <a:extLst>
-              <a:ext uri="{28A0092B-C50C-407E-A947-70E740481C1C}">
-                <a14:useLocalDpi xmlns:a14="http://schemas.microsoft.com/office/drawing/2010/main" val="0"/>
-              </a:ext>
-            </a:extLst>
-          </a:blip>
-          <a:srcRect/>
-          <a:stretch>
-            <a:fillRect/>
-          </a:stretch>
-        </p:blipFill>
-        <p:spPr bwMode="auto">
-          <a:xfrm>
-            <a:off x="518071" y="3581400"/>
-            <a:ext cx="4782198" cy="990600"/>
-          </a:xfrm>
-          <a:prstGeom prst="rect">
-            <a:avLst/>
-          </a:prstGeom>
-          <a:noFill/>
-          <a:extLst>
-            <a:ext uri="{909E8E84-426E-40DD-AFC4-6F175D3DCCD1}">
-              <a14:hiddenFill xmlns:a14="http://schemas.microsoft.com/office/drawing/2010/main">
-                <a:solidFill>
-                  <a:srgbClr val="FFFFFF"/>
-                </a:solidFill>
-              </a14:hiddenFill>
-            </a:ext>
-          </a:extLst>
-        </p:spPr>
-      </p:pic>
       <mc:AlternateContent xmlns:mc="http://schemas.openxmlformats.org/markup-compatibility/2006" xmlns:a14="http://schemas.microsoft.com/office/drawing/2010/main">
         <mc:Choice Requires="a14">
           <p:sp>
@@ -9258,8 +10361,8 @@
             </p:nvSpPr>
             <p:spPr>
               <a:xfrm>
-                <a:off x="518071" y="4876800"/>
-                <a:ext cx="2834730" cy="584775"/>
+                <a:off x="623664" y="5257800"/>
+                <a:ext cx="2057400" cy="461665"/>
               </a:xfrm>
               <a:prstGeom prst="rect">
                 <a:avLst/>
@@ -9281,14 +10384,14 @@
                       <m:sSup>
                         <m:sSupPr>
                           <m:ctrlPr>
-                            <a:rPr lang="en-US" sz="3200" b="0" i="1" smtClean="0">
+                            <a:rPr lang="en-US" sz="2400" b="0" i="1" smtClean="0">
                               <a:latin typeface="Cambria Math"/>
                             </a:rPr>
                           </m:ctrlPr>
                         </m:sSupPr>
                         <m:e>
                           <m:r>
-                            <a:rPr lang="en-US" sz="3200" b="0" i="1" smtClean="0">
+                            <a:rPr lang="en-US" sz="2400" b="0" i="1" smtClean="0">
                               <a:latin typeface="Cambria Math"/>
                             </a:rPr>
                             <m:t>𝑥</m:t>
@@ -9296,7 +10399,7 @@
                         </m:e>
                         <m:sup>
                           <m:r>
-                            <a:rPr lang="en-US" sz="3200" b="0" i="1" smtClean="0">
+                            <a:rPr lang="en-US" sz="2400" b="0" i="1" smtClean="0">
                               <a:latin typeface="Cambria Math"/>
                             </a:rPr>
                             <m:t>′</m:t>
@@ -9304,13 +10407,13 @@
                         </m:sup>
                       </m:sSup>
                       <m:r>
-                        <a:rPr lang="en-US" sz="3200" b="0" i="1" smtClean="0">
+                        <a:rPr lang="en-US" sz="2400" b="0" i="1" smtClean="0">
                           <a:latin typeface="Cambria Math"/>
                         </a:rPr>
                         <m:t>=</m:t>
                       </m:r>
                       <m:r>
-                        <a:rPr lang="en-US" sz="3200" b="0" i="1" smtClean="0">
+                        <a:rPr lang="en-US" sz="2400" b="0" i="1" smtClean="0">
                           <a:latin typeface="Cambria Math"/>
                         </a:rPr>
                         <m:t>𝐻𝑥</m:t>
@@ -9318,7 +10421,7 @@
                     </m:oMath>
                   </m:oMathPara>
                 </a14:m>
-                <a:endParaRPr lang="en-US" sz="3200" dirty="0"/>
+                <a:endParaRPr lang="en-US" sz="2400" dirty="0"/>
               </a:p>
             </p:txBody>
           </p:sp>
@@ -9334,14 +10437,14 @@
             </p:nvSpPr>
             <p:spPr>
               <a:xfrm>
-                <a:off x="518071" y="4876800"/>
-                <a:ext cx="2834730" cy="584775"/>
+                <a:off x="623664" y="5257800"/>
+                <a:ext cx="2057400" cy="461665"/>
               </a:xfrm>
               <a:prstGeom prst="rect">
                 <a:avLst/>
               </a:prstGeom>
               <a:blipFill rotWithShape="1">
-                <a:blip r:embed="rId6"/>
+                <a:blip r:embed="rId4"/>
                 <a:stretch>
                   <a:fillRect/>
                 </a:stretch>
@@ -9370,8 +10473,8 @@
         </p:nvSpPr>
         <p:spPr>
           <a:xfrm>
-            <a:off x="3352801" y="6019800"/>
-            <a:ext cx="5486399" cy="523220"/>
+            <a:off x="3377514" y="6320135"/>
+            <a:ext cx="5486399" cy="461665"/>
           </a:xfrm>
           <a:prstGeom prst="rect">
             <a:avLst/>
@@ -9385,31 +10488,23 @@
           <a:lstStyle/>
           <a:p>
             <a:r>
-              <a:rPr lang="en-US" sz="1400" dirty="0" smtClean="0"/>
-              <a:t>Source: </a:t>
-            </a:r>
-            <a:r>
-              <a:rPr lang="en-US" sz="1400" dirty="0" smtClean="0"/>
-              <a:t>JP Mellor, CSSE 461 Computer Vision, </a:t>
-            </a:r>
-            <a:r>
-              <a:rPr lang="en-US" sz="1400" dirty="0" smtClean="0"/>
-              <a:t>and</a:t>
-            </a:r>
-          </a:p>
-          <a:p>
-            <a:r>
-              <a:rPr lang="en-US" sz="1400" dirty="0" smtClean="0">
-                <a:hlinkClick r:id="rId7"/>
+              <a:rPr lang="en-US" sz="1200" dirty="0" smtClean="0"/>
+              <a:t>Source: JP Mellor, CSSE 461 Computer Vision, and</a:t>
+            </a:r>
+          </a:p>
+          <a:p>
+            <a:r>
+              <a:rPr lang="en-US" sz="1200" dirty="0" smtClean="0">
+                <a:hlinkClick r:id="rId5"/>
               </a:rPr>
               <a:t>http://www.epixea.com/research/multi-view-coding-thesisse9.html</a:t>
             </a:r>
-            <a:endParaRPr lang="en-US" sz="1400" dirty="0"/>
+            <a:endParaRPr lang="en-US" sz="1200" dirty="0"/>
           </a:p>
         </p:txBody>
       </p:sp>
-      <mc:AlternateContent xmlns:mc="http://schemas.openxmlformats.org/markup-compatibility/2006">
-        <mc:Choice xmlns:a14="http://schemas.microsoft.com/office/drawing/2010/main" Requires="a14">
+      <mc:AlternateContent xmlns:mc="http://schemas.openxmlformats.org/markup-compatibility/2006" xmlns:a14="http://schemas.microsoft.com/office/drawing/2010/main">
+        <mc:Choice Requires="a14">
           <p:sp>
             <p:nvSpPr>
               <p:cNvPr id="7" name="TextBox 6"/>
@@ -9418,8 +10513,8 @@
             </p:nvSpPr>
             <p:spPr>
               <a:xfrm>
-                <a:off x="5638800" y="1347371"/>
-                <a:ext cx="3200400" cy="3139321"/>
+                <a:off x="5684108" y="907988"/>
+                <a:ext cx="3200400" cy="4185761"/>
               </a:xfrm>
               <a:prstGeom prst="rect">
                 <a:avLst/>
@@ -9433,15 +10528,30 @@
               <a:lstStyle/>
               <a:p>
                 <a:r>
-                  <a:rPr lang="en-US" dirty="0" smtClean="0"/>
-                  <a:t>K: Intrinsic Parameter of a Camera</a:t>
+                  <a:rPr lang="en-US" sz="1400" dirty="0" smtClean="0"/>
+                  <a:t>P: Product of Intrinsic and Extrinsic Parameters of the camera</a:t>
                 </a:r>
               </a:p>
               <a:p>
+                <a:endParaRPr lang="en-US" sz="1400" dirty="0" smtClean="0"/>
+              </a:p>
+              <a:p>
                 <a:r>
-                  <a:rPr lang="en-US" dirty="0" smtClean="0"/>
+                  <a:rPr lang="en-US" sz="1400" dirty="0" smtClean="0"/>
+                  <a:t>K: Intrinsic Parameter of a Camera (3x3)</a:t>
+                </a:r>
+              </a:p>
+              <a:p>
+                <a:endParaRPr lang="en-US" sz="1400" dirty="0" smtClean="0"/>
+              </a:p>
+              <a:p>
+                <a:r>
+                  <a:rPr lang="en-US" sz="1400" dirty="0" smtClean="0"/>
                   <a:t>R: Rotation of the camera (3x3)</a:t>
                 </a:r>
+              </a:p>
+              <a:p>
+                <a:endParaRPr lang="en-US" sz="1400" dirty="0" smtClean="0"/>
               </a:p>
               <a:p>
                 <a14:m>
@@ -9449,14 +10559,14 @@
                     <m:sSub>
                       <m:sSubPr>
                         <m:ctrlPr>
-                          <a:rPr lang="en-US" i="1">
+                          <a:rPr lang="en-US" sz="1400" i="1">
                             <a:latin typeface="Cambria Math"/>
                           </a:rPr>
                         </m:ctrlPr>
                       </m:sSubPr>
                       <m:e>
                         <m:r>
-                          <a:rPr lang="en-US" i="1">
+                          <a:rPr lang="en-US" sz="1400" i="1">
                             <a:latin typeface="Cambria Math"/>
                           </a:rPr>
                           <m:t>𝑟</m:t>
@@ -9464,7 +10574,7 @@
                       </m:e>
                       <m:sub>
                         <m:r>
-                          <a:rPr lang="en-US" i="1">
+                          <a:rPr lang="en-US" sz="1400" i="1">
                             <a:latin typeface="Cambria Math"/>
                           </a:rPr>
                           <m:t>1</m:t>
@@ -9472,7 +10582,7 @@
                       </m:sub>
                     </m:sSub>
                     <m:r>
-                      <a:rPr lang="en-US" i="1">
+                      <a:rPr lang="en-US" sz="1400" i="1">
                         <a:latin typeface="Cambria Math"/>
                       </a:rPr>
                       <m:t>, </m:t>
@@ -9480,14 +10590,14 @@
                     <m:sSub>
                       <m:sSubPr>
                         <m:ctrlPr>
-                          <a:rPr lang="en-US" i="1">
+                          <a:rPr lang="en-US" sz="1400" i="1">
                             <a:latin typeface="Cambria Math"/>
                           </a:rPr>
                         </m:ctrlPr>
                       </m:sSubPr>
                       <m:e>
                         <m:r>
-                          <a:rPr lang="en-US" i="1">
+                          <a:rPr lang="en-US" sz="1400" i="1">
                             <a:latin typeface="Cambria Math"/>
                           </a:rPr>
                           <m:t>𝑟</m:t>
@@ -9495,7 +10605,7 @@
                       </m:e>
                       <m:sub>
                         <m:r>
-                          <a:rPr lang="en-US" i="1">
+                          <a:rPr lang="en-US" sz="1400" i="1">
                             <a:latin typeface="Cambria Math"/>
                           </a:rPr>
                           <m:t>2</m:t>
@@ -9503,7 +10613,7 @@
                       </m:sub>
                     </m:sSub>
                     <m:r>
-                      <a:rPr lang="en-US" i="1">
+                      <a:rPr lang="en-US" sz="1400" i="1">
                         <a:latin typeface="Cambria Math"/>
                       </a:rPr>
                       <m:t>, </m:t>
@@ -9511,14 +10621,14 @@
                     <m:sSub>
                       <m:sSubPr>
                         <m:ctrlPr>
-                          <a:rPr lang="en-US" i="1">
+                          <a:rPr lang="en-US" sz="1400" i="1">
                             <a:latin typeface="Cambria Math"/>
                           </a:rPr>
                         </m:ctrlPr>
                       </m:sSubPr>
                       <m:e>
                         <m:r>
-                          <a:rPr lang="en-US" i="1">
+                          <a:rPr lang="en-US" sz="1400" i="1">
                             <a:latin typeface="Cambria Math"/>
                           </a:rPr>
                           <m:t>𝑟</m:t>
@@ -9526,7 +10636,7 @@
                       </m:e>
                       <m:sub>
                         <m:r>
-                          <a:rPr lang="en-US" i="1">
+                          <a:rPr lang="en-US" sz="1400" i="1">
                             <a:latin typeface="Cambria Math"/>
                           </a:rPr>
                           <m:t>3</m:t>
@@ -9536,60 +10646,75 @@
                   </m:oMath>
                 </a14:m>
                 <a:r>
-                  <a:rPr lang="en-US" dirty="0"/>
+                  <a:rPr lang="en-US" sz="1400" dirty="0"/>
                   <a:t>: columns of </a:t>
                 </a:r>
                 <a:r>
-                  <a:rPr lang="en-US" dirty="0" smtClean="0"/>
+                  <a:rPr lang="en-US" sz="1400" dirty="0" smtClean="0"/>
                   <a:t>R</a:t>
                 </a:r>
               </a:p>
               <a:p>
+                <a:endParaRPr lang="en-US" sz="1400" dirty="0" smtClean="0"/>
+              </a:p>
+              <a:p>
                 <a:r>
-                  <a:rPr lang="en-US" dirty="0" smtClean="0"/>
+                  <a:rPr lang="en-US" sz="1400" dirty="0" smtClean="0"/>
                   <a:t>C: Location of the camera in real-world coordinates (3x1)</a:t>
                 </a:r>
               </a:p>
               <a:p>
+                <a:endParaRPr lang="en-US" sz="1400" dirty="0" smtClean="0"/>
+              </a:p>
+              <a:p>
                 <a:r>
-                  <a:rPr lang="en-US" dirty="0" err="1" smtClean="0"/>
+                  <a:rPr lang="en-US" sz="1400" dirty="0" err="1" smtClean="0"/>
                   <a:t>x,y</a:t>
                 </a:r>
                 <a:r>
-                  <a:rPr lang="en-US" dirty="0" smtClean="0"/>
+                  <a:rPr lang="en-US" sz="1400" dirty="0" smtClean="0"/>
                   <a:t>: image coordinates</a:t>
                 </a:r>
               </a:p>
               <a:p>
+                <a:endParaRPr lang="en-US" sz="1400" dirty="0" smtClean="0"/>
+              </a:p>
+              <a:p>
                 <a:r>
-                  <a:rPr lang="en-US" dirty="0" smtClean="0"/>
+                  <a:rPr lang="en-US" sz="1400" dirty="0" smtClean="0"/>
                   <a:t>X, Y, Z: real-world coordinates</a:t>
                 </a:r>
               </a:p>
               <a:p>
+                <a:endParaRPr lang="en-US" sz="1400" dirty="0" smtClean="0"/>
+              </a:p>
+              <a:p>
                 <a:r>
-                  <a:rPr lang="en-US" dirty="0" smtClean="0"/>
+                  <a:rPr lang="en-US" sz="1400" dirty="0" smtClean="0"/>
                   <a:t>t = -RC (3x1)</a:t>
                 </a:r>
               </a:p>
               <a:p>
+                <a:endParaRPr lang="en-US" sz="1400" dirty="0" smtClean="0"/>
+              </a:p>
+              <a:p>
                 <a:r>
-                  <a:rPr lang="en-US" dirty="0" smtClean="0"/>
+                  <a:rPr lang="en-US" sz="1400" dirty="0" smtClean="0"/>
                   <a:t>H: </a:t>
                 </a:r>
                 <a:r>
-                  <a:rPr lang="en-US" dirty="0" err="1" smtClean="0"/>
+                  <a:rPr lang="en-US" sz="1400" dirty="0" err="1" smtClean="0"/>
                   <a:t>Homography</a:t>
                 </a:r>
                 <a:r>
-                  <a:rPr lang="en-US" dirty="0" smtClean="0"/>
+                  <a:rPr lang="en-US" sz="1400" dirty="0" smtClean="0"/>
                   <a:t> transform matrix</a:t>
                 </a:r>
               </a:p>
             </p:txBody>
           </p:sp>
         </mc:Choice>
-        <mc:Fallback>
+        <mc:Fallback xmlns="">
           <p:sp>
             <p:nvSpPr>
               <p:cNvPr id="7" name="TextBox 6"/>
@@ -9600,8 +10725,911 @@
             </p:nvSpPr>
             <p:spPr>
               <a:xfrm>
-                <a:off x="5638800" y="1347371"/>
-                <a:ext cx="3200400" cy="3139321"/>
+                <a:off x="5684108" y="907988"/>
+                <a:ext cx="3200400" cy="4185761"/>
+              </a:xfrm>
+              <a:prstGeom prst="rect">
+                <a:avLst/>
+              </a:prstGeom>
+              <a:blipFill rotWithShape="1">
+                <a:blip r:embed="rId6"/>
+                <a:stretch>
+                  <a:fillRect l="-381" t="-146" b="-437"/>
+                </a:stretch>
+              </a:blipFill>
+            </p:spPr>
+            <p:txBody>
+              <a:bodyPr/>
+              <a:lstStyle/>
+              <a:p>
+                <a:r>
+                  <a:rPr lang="en-US">
+                    <a:noFill/>
+                  </a:rPr>
+                  <a:t> </a:t>
+                </a:r>
+              </a:p>
+            </p:txBody>
+          </p:sp>
+        </mc:Fallback>
+      </mc:AlternateContent>
+      <mc:AlternateContent xmlns:mc="http://schemas.openxmlformats.org/markup-compatibility/2006" xmlns:a14="http://schemas.microsoft.com/office/drawing/2010/main">
+        <mc:Choice Requires="a14">
+          <p:sp>
+            <p:nvSpPr>
+              <p:cNvPr id="3" name="TextBox 2"/>
+              <p:cNvSpPr txBox="1"/>
+              <p:nvPr/>
+            </p:nvSpPr>
+            <p:spPr>
+              <a:xfrm>
+                <a:off x="304800" y="2362200"/>
+                <a:ext cx="5325761" cy="999441"/>
+              </a:xfrm>
+              <a:prstGeom prst="rect">
+                <a:avLst/>
+              </a:prstGeom>
+              <a:noFill/>
+            </p:spPr>
+            <p:txBody>
+              <a:bodyPr wrap="square" rtlCol="0">
+                <a:spAutoFit/>
+              </a:bodyPr>
+              <a:lstStyle/>
+              <a:p>
+                <a:pPr/>
+                <a14:m>
+                  <m:oMathPara xmlns:m="http://schemas.openxmlformats.org/officeDocument/2006/math">
+                    <m:oMathParaPr>
+                      <m:jc m:val="centerGroup"/>
+                    </m:oMathParaPr>
+                    <m:oMath xmlns:m="http://schemas.openxmlformats.org/officeDocument/2006/math">
+                      <m:r>
+                        <a:rPr lang="en-US" sz="1600" b="0" i="1" smtClean="0">
+                          <a:latin typeface="Cambria Math"/>
+                        </a:rPr>
+                        <m:t>𝜆</m:t>
+                      </m:r>
+                      <m:d>
+                        <m:dPr>
+                          <m:ctrlPr>
+                            <a:rPr lang="en-US" sz="1600" b="0" i="1" smtClean="0">
+                              <a:latin typeface="Cambria Math"/>
+                            </a:rPr>
+                          </m:ctrlPr>
+                        </m:dPr>
+                        <m:e>
+                          <m:m>
+                            <m:mPr>
+                              <m:mcs>
+                                <m:mc>
+                                  <m:mcPr>
+                                    <m:count m:val="1"/>
+                                    <m:mcJc m:val="center"/>
+                                  </m:mcPr>
+                                </m:mc>
+                              </m:mcs>
+                              <m:ctrlPr>
+                                <a:rPr lang="en-US" sz="1600" b="0" i="1" smtClean="0">
+                                  <a:latin typeface="Cambria Math"/>
+                                </a:rPr>
+                              </m:ctrlPr>
+                            </m:mPr>
+                            <m:mr>
+                              <m:e>
+                                <m:r>
+                                  <m:rPr>
+                                    <m:brk m:alnAt="7"/>
+                                  </m:rPr>
+                                  <a:rPr lang="en-US" sz="1600" b="0" i="1" smtClean="0">
+                                    <a:latin typeface="Cambria Math"/>
+                                  </a:rPr>
+                                  <m:t>𝑥</m:t>
+                                </m:r>
+                              </m:e>
+                            </m:mr>
+                            <m:mr>
+                              <m:e>
+                                <m:r>
+                                  <a:rPr lang="en-US" sz="1600" b="0" i="1" smtClean="0">
+                                    <a:latin typeface="Cambria Math"/>
+                                  </a:rPr>
+                                  <m:t>𝑦</m:t>
+                                </m:r>
+                              </m:e>
+                            </m:mr>
+                            <m:mr>
+                              <m:e>
+                                <m:r>
+                                  <a:rPr lang="en-US" sz="1600" b="0" i="1" smtClean="0">
+                                    <a:latin typeface="Cambria Math"/>
+                                  </a:rPr>
+                                  <m:t>1</m:t>
+                                </m:r>
+                              </m:e>
+                            </m:mr>
+                          </m:m>
+                        </m:e>
+                      </m:d>
+                      <m:r>
+                        <a:rPr lang="en-US" sz="1600" b="0" i="1" smtClean="0">
+                          <a:latin typeface="Cambria Math"/>
+                        </a:rPr>
+                        <m:t>=</m:t>
+                      </m:r>
+                      <m:d>
+                        <m:dPr>
+                          <m:begChr m:val="["/>
+                          <m:endChr m:val="]"/>
+                          <m:ctrlPr>
+                            <a:rPr lang="en-US" sz="1600" b="0" i="1" smtClean="0">
+                              <a:latin typeface="Cambria Math"/>
+                            </a:rPr>
+                          </m:ctrlPr>
+                        </m:dPr>
+                        <m:e>
+                          <m:m>
+                            <m:mPr>
+                              <m:mcs>
+                                <m:mc>
+                                  <m:mcPr>
+                                    <m:count m:val="3"/>
+                                    <m:mcJc m:val="center"/>
+                                  </m:mcPr>
+                                </m:mc>
+                              </m:mcs>
+                              <m:ctrlPr>
+                                <a:rPr lang="en-US" sz="1600" b="0" i="1" smtClean="0">
+                                  <a:latin typeface="Cambria Math"/>
+                                </a:rPr>
+                              </m:ctrlPr>
+                            </m:mPr>
+                            <m:mr>
+                              <m:e/>
+                              <m:e/>
+                              <m:e>
+                                <m:m>
+                                  <m:mPr>
+                                    <m:mcs>
+                                      <m:mc>
+                                        <m:mcPr>
+                                          <m:count m:val="2"/>
+                                          <m:mcJc m:val="center"/>
+                                        </m:mcPr>
+                                      </m:mc>
+                                    </m:mcs>
+                                    <m:ctrlPr>
+                                      <a:rPr lang="en-US" sz="1600" b="0" i="1" smtClean="0">
+                                        <a:latin typeface="Cambria Math"/>
+                                      </a:rPr>
+                                    </m:ctrlPr>
+                                  </m:mPr>
+                                  <m:mr>
+                                    <m:e/>
+                                    <m:e>
+                                      <m:r>
+                                        <a:rPr lang="en-US" sz="1600" b="0" i="1" smtClean="0">
+                                          <a:latin typeface="Cambria Math"/>
+                                        </a:rPr>
+                                        <m:t>0</m:t>
+                                      </m:r>
+                                    </m:e>
+                                  </m:mr>
+                                </m:m>
+                              </m:e>
+                            </m:mr>
+                            <m:mr>
+                              <m:e/>
+                              <m:e>
+                                <m:r>
+                                  <a:rPr lang="en-US" sz="1600" b="0" i="1" smtClean="0">
+                                    <a:latin typeface="Cambria Math"/>
+                                  </a:rPr>
+                                  <m:t>𝐾</m:t>
+                                </m:r>
+                              </m:e>
+                              <m:e>
+                                <m:m>
+                                  <m:mPr>
+                                    <m:mcs>
+                                      <m:mc>
+                                        <m:mcPr>
+                                          <m:count m:val="2"/>
+                                          <m:mcJc m:val="center"/>
+                                        </m:mcPr>
+                                      </m:mc>
+                                    </m:mcs>
+                                    <m:ctrlPr>
+                                      <a:rPr lang="en-US" sz="1600" b="0" i="1" smtClean="0">
+                                        <a:latin typeface="Cambria Math"/>
+                                      </a:rPr>
+                                    </m:ctrlPr>
+                                  </m:mPr>
+                                  <m:mr>
+                                    <m:e/>
+                                    <m:e>
+                                      <m:r>
+                                        <a:rPr lang="en-US" sz="1600" b="0" i="1" smtClean="0">
+                                          <a:latin typeface="Cambria Math"/>
+                                        </a:rPr>
+                                        <m:t>0</m:t>
+                                      </m:r>
+                                    </m:e>
+                                  </m:mr>
+                                </m:m>
+                              </m:e>
+                            </m:mr>
+                            <m:mr>
+                              <m:e/>
+                              <m:e/>
+                              <m:e>
+                                <m:m>
+                                  <m:mPr>
+                                    <m:mcs>
+                                      <m:mc>
+                                        <m:mcPr>
+                                          <m:count m:val="2"/>
+                                          <m:mcJc m:val="center"/>
+                                        </m:mcPr>
+                                      </m:mc>
+                                    </m:mcs>
+                                    <m:ctrlPr>
+                                      <a:rPr lang="en-US" sz="1600" b="0" i="1" smtClean="0">
+                                        <a:latin typeface="Cambria Math"/>
+                                      </a:rPr>
+                                    </m:ctrlPr>
+                                  </m:mPr>
+                                  <m:mr>
+                                    <m:e/>
+                                    <m:e>
+                                      <m:r>
+                                        <a:rPr lang="en-US" sz="1600" b="0" i="1" smtClean="0">
+                                          <a:latin typeface="Cambria Math"/>
+                                        </a:rPr>
+                                        <m:t>0</m:t>
+                                      </m:r>
+                                    </m:e>
+                                  </m:mr>
+                                </m:m>
+                              </m:e>
+                            </m:mr>
+                          </m:m>
+                        </m:e>
+                      </m:d>
+                      <m:d>
+                        <m:dPr>
+                          <m:begChr m:val="["/>
+                          <m:endChr m:val="]"/>
+                          <m:ctrlPr>
+                            <a:rPr lang="en-US" sz="1600" b="0" i="1" smtClean="0">
+                              <a:latin typeface="Cambria Math"/>
+                            </a:rPr>
+                          </m:ctrlPr>
+                        </m:dPr>
+                        <m:e>
+                          <m:m>
+                            <m:mPr>
+                              <m:mcs>
+                                <m:mc>
+                                  <m:mcPr>
+                                    <m:count m:val="2"/>
+                                    <m:mcJc m:val="center"/>
+                                  </m:mcPr>
+                                </m:mc>
+                              </m:mcs>
+                              <m:ctrlPr>
+                                <a:rPr lang="en-US" sz="1600" b="0" i="1" smtClean="0">
+                                  <a:latin typeface="Cambria Math"/>
+                                </a:rPr>
+                              </m:ctrlPr>
+                            </m:mPr>
+                            <m:mr>
+                              <m:e>
+                                <m:m>
+                                  <m:mPr>
+                                    <m:mcs>
+                                      <m:mc>
+                                        <m:mcPr>
+                                          <m:count m:val="2"/>
+                                          <m:mcJc m:val="center"/>
+                                        </m:mcPr>
+                                      </m:mc>
+                                    </m:mcs>
+                                    <m:ctrlPr>
+                                      <a:rPr lang="en-US" sz="1600" b="0" i="1" smtClean="0">
+                                        <a:latin typeface="Cambria Math"/>
+                                      </a:rPr>
+                                    </m:ctrlPr>
+                                  </m:mPr>
+                                  <m:mr>
+                                    <m:e/>
+                                    <m:e/>
+                                  </m:mr>
+                                  <m:mr>
+                                    <m:e/>
+                                    <m:e>
+                                      <m:r>
+                                        <a:rPr lang="en-US" sz="1600" b="0" i="1" smtClean="0">
+                                          <a:latin typeface="Cambria Math"/>
+                                        </a:rPr>
+                                        <m:t>𝑅</m:t>
+                                      </m:r>
+                                    </m:e>
+                                  </m:mr>
+                                </m:m>
+                              </m:e>
+                              <m:e>
+                                <m:m>
+                                  <m:mPr>
+                                    <m:mcs>
+                                      <m:mc>
+                                        <m:mcPr>
+                                          <m:count m:val="2"/>
+                                          <m:mcJc m:val="center"/>
+                                        </m:mcPr>
+                                      </m:mc>
+                                    </m:mcs>
+                                    <m:ctrlPr>
+                                      <a:rPr lang="en-US" sz="1600" b="0" i="1" smtClean="0">
+                                        <a:latin typeface="Cambria Math"/>
+                                      </a:rPr>
+                                    </m:ctrlPr>
+                                  </m:mPr>
+                                  <m:mr>
+                                    <m:e/>
+                                    <m:e/>
+                                  </m:mr>
+                                  <m:mr>
+                                    <m:e/>
+                                    <m:e>
+                                      <m:r>
+                                        <a:rPr lang="en-US" sz="1600" b="0" i="1" smtClean="0">
+                                          <a:latin typeface="Cambria Math"/>
+                                        </a:rPr>
+                                        <m:t>−</m:t>
+                                      </m:r>
+                                      <m:r>
+                                        <a:rPr lang="en-US" sz="1600" b="0" i="1" smtClean="0">
+                                          <a:latin typeface="Cambria Math"/>
+                                        </a:rPr>
+                                        <m:t>𝑅𝐶</m:t>
+                                      </m:r>
+                                    </m:e>
+                                  </m:mr>
+                                </m:m>
+                              </m:e>
+                            </m:mr>
+                            <m:mr>
+                              <m:e>
+                                <m:m>
+                                  <m:mPr>
+                                    <m:mcs>
+                                      <m:mc>
+                                        <m:mcPr>
+                                          <m:count m:val="2"/>
+                                          <m:mcJc m:val="center"/>
+                                        </m:mcPr>
+                                      </m:mc>
+                                    </m:mcs>
+                                    <m:ctrlPr>
+                                      <a:rPr lang="en-US" sz="1600" b="0" i="1" smtClean="0">
+                                        <a:latin typeface="Cambria Math"/>
+                                      </a:rPr>
+                                    </m:ctrlPr>
+                                  </m:mPr>
+                                  <m:mr>
+                                    <m:e/>
+                                    <m:e/>
+                                  </m:mr>
+                                  <m:mr>
+                                    <m:e>
+                                      <m:r>
+                                        <a:rPr lang="en-US" sz="1600" b="0" i="1" smtClean="0">
+                                          <a:latin typeface="Cambria Math"/>
+                                        </a:rPr>
+                                        <m:t>0</m:t>
+                                      </m:r>
+                                    </m:e>
+                                    <m:e>
+                                      <m:r>
+                                        <a:rPr lang="en-US" sz="1600" b="0" i="1" smtClean="0">
+                                          <a:latin typeface="Cambria Math"/>
+                                        </a:rPr>
+                                        <m:t>0</m:t>
+                                      </m:r>
+                                    </m:e>
+                                  </m:mr>
+                                </m:m>
+                              </m:e>
+                              <m:e>
+                                <m:m>
+                                  <m:mPr>
+                                    <m:mcs>
+                                      <m:mc>
+                                        <m:mcPr>
+                                          <m:count m:val="2"/>
+                                          <m:mcJc m:val="center"/>
+                                        </m:mcPr>
+                                      </m:mc>
+                                    </m:mcs>
+                                    <m:ctrlPr>
+                                      <a:rPr lang="en-US" sz="1600" b="0" i="1" smtClean="0">
+                                        <a:latin typeface="Cambria Math"/>
+                                      </a:rPr>
+                                    </m:ctrlPr>
+                                  </m:mPr>
+                                  <m:mr>
+                                    <m:e/>
+                                    <m:e/>
+                                  </m:mr>
+                                  <m:mr>
+                                    <m:e>
+                                      <m:r>
+                                        <a:rPr lang="en-US" sz="1600" b="0" i="1" smtClean="0">
+                                          <a:latin typeface="Cambria Math"/>
+                                        </a:rPr>
+                                        <m:t>0</m:t>
+                                      </m:r>
+                                    </m:e>
+                                    <m:e>
+                                      <m:r>
+                                        <a:rPr lang="en-US" sz="1600" b="0" i="1" smtClean="0">
+                                          <a:latin typeface="Cambria Math"/>
+                                        </a:rPr>
+                                        <m:t>1</m:t>
+                                      </m:r>
+                                    </m:e>
+                                  </m:mr>
+                                </m:m>
+                              </m:e>
+                            </m:mr>
+                          </m:m>
+                        </m:e>
+                      </m:d>
+                      <m:d>
+                        <m:dPr>
+                          <m:ctrlPr>
+                            <a:rPr lang="en-US" sz="1600" b="0" i="1" smtClean="0">
+                              <a:latin typeface="Cambria Math"/>
+                            </a:rPr>
+                          </m:ctrlPr>
+                        </m:dPr>
+                        <m:e>
+                          <m:m>
+                            <m:mPr>
+                              <m:mcs>
+                                <m:mc>
+                                  <m:mcPr>
+                                    <m:count m:val="1"/>
+                                    <m:mcJc m:val="center"/>
+                                  </m:mcPr>
+                                </m:mc>
+                              </m:mcs>
+                              <m:ctrlPr>
+                                <a:rPr lang="en-US" sz="1600" b="0" i="1" smtClean="0">
+                                  <a:latin typeface="Cambria Math"/>
+                                </a:rPr>
+                              </m:ctrlPr>
+                            </m:mPr>
+                            <m:mr>
+                              <m:e>
+                                <m:r>
+                                  <m:rPr>
+                                    <m:brk m:alnAt="7"/>
+                                  </m:rPr>
+                                  <a:rPr lang="en-US" sz="1600" b="0" i="1" smtClean="0">
+                                    <a:latin typeface="Cambria Math"/>
+                                  </a:rPr>
+                                  <m:t>𝑋</m:t>
+                                </m:r>
+                              </m:e>
+                            </m:mr>
+                            <m:mr>
+                              <m:e>
+                                <m:r>
+                                  <a:rPr lang="en-US" sz="1600" b="0" i="1" smtClean="0">
+                                    <a:latin typeface="Cambria Math"/>
+                                  </a:rPr>
+                                  <m:t>𝑌</m:t>
+                                </m:r>
+                              </m:e>
+                            </m:mr>
+                            <m:mr>
+                              <m:e>
+                                <m:m>
+                                  <m:mPr>
+                                    <m:mcs>
+                                      <m:mc>
+                                        <m:mcPr>
+                                          <m:count m:val="1"/>
+                                          <m:mcJc m:val="center"/>
+                                        </m:mcPr>
+                                      </m:mc>
+                                    </m:mcs>
+                                    <m:ctrlPr>
+                                      <a:rPr lang="en-US" sz="1600" b="0" i="1" smtClean="0">
+                                        <a:latin typeface="Cambria Math"/>
+                                      </a:rPr>
+                                    </m:ctrlPr>
+                                  </m:mPr>
+                                  <m:mr>
+                                    <m:e>
+                                      <m:r>
+                                        <m:rPr>
+                                          <m:brk m:alnAt="7"/>
+                                        </m:rPr>
+                                        <a:rPr lang="en-US" sz="1600" b="0" i="1" smtClean="0">
+                                          <a:latin typeface="Cambria Math"/>
+                                        </a:rPr>
+                                        <m:t>𝑍</m:t>
+                                      </m:r>
+                                      <m:r>
+                                        <a:rPr lang="en-US" sz="1600" b="0" i="1" smtClean="0">
+                                          <a:latin typeface="Cambria Math"/>
+                                        </a:rPr>
+                                        <m:t>=0</m:t>
+                                      </m:r>
+                                    </m:e>
+                                  </m:mr>
+                                  <m:mr>
+                                    <m:e>
+                                      <m:r>
+                                        <a:rPr lang="en-US" sz="1600" b="0" i="1" smtClean="0">
+                                          <a:latin typeface="Cambria Math"/>
+                                        </a:rPr>
+                                        <m:t>1</m:t>
+                                      </m:r>
+                                    </m:e>
+                                  </m:mr>
+                                </m:m>
+                              </m:e>
+                            </m:mr>
+                          </m:m>
+                        </m:e>
+                      </m:d>
+                    </m:oMath>
+                  </m:oMathPara>
+                </a14:m>
+                <a:endParaRPr lang="en-US" sz="1600" dirty="0"/>
+              </a:p>
+            </p:txBody>
+          </p:sp>
+        </mc:Choice>
+        <mc:Fallback xmlns="">
+          <p:sp>
+            <p:nvSpPr>
+              <p:cNvPr id="3" name="TextBox 2"/>
+              <p:cNvSpPr txBox="1">
+                <a:spLocks noRot="1" noChangeAspect="1" noMove="1" noResize="1" noEditPoints="1" noAdjustHandles="1" noChangeArrowheads="1" noChangeShapeType="1" noTextEdit="1"/>
+              </p:cNvSpPr>
+              <p:nvPr/>
+            </p:nvSpPr>
+            <p:spPr>
+              <a:xfrm>
+                <a:off x="304800" y="2362200"/>
+                <a:ext cx="5325761" cy="999441"/>
+              </a:xfrm>
+              <a:prstGeom prst="rect">
+                <a:avLst/>
+              </a:prstGeom>
+              <a:blipFill rotWithShape="1">
+                <a:blip r:embed="rId7"/>
+                <a:stretch>
+                  <a:fillRect/>
+                </a:stretch>
+              </a:blipFill>
+            </p:spPr>
+            <p:txBody>
+              <a:bodyPr/>
+              <a:lstStyle/>
+              <a:p>
+                <a:r>
+                  <a:rPr lang="en-US">
+                    <a:noFill/>
+                  </a:rPr>
+                  <a:t> </a:t>
+                </a:r>
+              </a:p>
+            </p:txBody>
+          </p:sp>
+        </mc:Fallback>
+      </mc:AlternateContent>
+      <mc:AlternateContent xmlns:mc="http://schemas.openxmlformats.org/markup-compatibility/2006" xmlns:a14="http://schemas.microsoft.com/office/drawing/2010/main">
+        <mc:Choice Requires="a14">
+          <p:sp>
+            <p:nvSpPr>
+              <p:cNvPr id="11" name="TextBox 10"/>
+              <p:cNvSpPr txBox="1"/>
+              <p:nvPr/>
+            </p:nvSpPr>
+            <p:spPr>
+              <a:xfrm>
+                <a:off x="313039" y="3429000"/>
+                <a:ext cx="5325761" cy="789512"/>
+              </a:xfrm>
+              <a:prstGeom prst="rect">
+                <a:avLst/>
+              </a:prstGeom>
+              <a:noFill/>
+            </p:spPr>
+            <p:txBody>
+              <a:bodyPr wrap="square" rtlCol="0">
+                <a:spAutoFit/>
+              </a:bodyPr>
+              <a:lstStyle/>
+              <a:p>
+                <a:pPr/>
+                <a14:m>
+                  <m:oMathPara xmlns:m="http://schemas.openxmlformats.org/officeDocument/2006/math">
+                    <m:oMathParaPr>
+                      <m:jc m:val="centerGroup"/>
+                    </m:oMathParaPr>
+                    <m:oMath xmlns:m="http://schemas.openxmlformats.org/officeDocument/2006/math">
+                      <m:r>
+                        <a:rPr lang="en-US" sz="1600" b="0" i="1" smtClean="0">
+                          <a:latin typeface="Cambria Math"/>
+                        </a:rPr>
+                        <m:t>𝜆</m:t>
+                      </m:r>
+                      <m:d>
+                        <m:dPr>
+                          <m:ctrlPr>
+                            <a:rPr lang="en-US" sz="1600" b="0" i="1" smtClean="0">
+                              <a:latin typeface="Cambria Math"/>
+                            </a:rPr>
+                          </m:ctrlPr>
+                        </m:dPr>
+                        <m:e>
+                          <m:m>
+                            <m:mPr>
+                              <m:mcs>
+                                <m:mc>
+                                  <m:mcPr>
+                                    <m:count m:val="1"/>
+                                    <m:mcJc m:val="center"/>
+                                  </m:mcPr>
+                                </m:mc>
+                              </m:mcs>
+                              <m:ctrlPr>
+                                <a:rPr lang="en-US" sz="1600" b="0" i="1" smtClean="0">
+                                  <a:latin typeface="Cambria Math"/>
+                                </a:rPr>
+                              </m:ctrlPr>
+                            </m:mPr>
+                            <m:mr>
+                              <m:e>
+                                <m:r>
+                                  <m:rPr>
+                                    <m:brk m:alnAt="7"/>
+                                  </m:rPr>
+                                  <a:rPr lang="en-US" sz="1600" b="0" i="1" smtClean="0">
+                                    <a:latin typeface="Cambria Math"/>
+                                  </a:rPr>
+                                  <m:t>𝑥</m:t>
+                                </m:r>
+                              </m:e>
+                            </m:mr>
+                            <m:mr>
+                              <m:e>
+                                <m:r>
+                                  <a:rPr lang="en-US" sz="1600" b="0" i="1" smtClean="0">
+                                    <a:latin typeface="Cambria Math"/>
+                                  </a:rPr>
+                                  <m:t>𝑦</m:t>
+                                </m:r>
+                              </m:e>
+                            </m:mr>
+                            <m:mr>
+                              <m:e>
+                                <m:r>
+                                  <a:rPr lang="en-US" sz="1600" b="0" i="1" smtClean="0">
+                                    <a:latin typeface="Cambria Math"/>
+                                  </a:rPr>
+                                  <m:t>1</m:t>
+                                </m:r>
+                              </m:e>
+                            </m:mr>
+                          </m:m>
+                        </m:e>
+                      </m:d>
+                      <m:r>
+                        <a:rPr lang="en-US" sz="1600" b="0" i="1" smtClean="0">
+                          <a:latin typeface="Cambria Math"/>
+                        </a:rPr>
+                        <m:t>=</m:t>
+                      </m:r>
+                      <m:r>
+                        <a:rPr lang="en-US" sz="1600" b="0" i="1" smtClean="0">
+                          <a:latin typeface="Cambria Math"/>
+                        </a:rPr>
+                        <m:t>𝐾</m:t>
+                      </m:r>
+                      <m:d>
+                        <m:dPr>
+                          <m:begChr m:val="["/>
+                          <m:endChr m:val="]"/>
+                          <m:ctrlPr>
+                            <a:rPr lang="en-US" sz="1600" b="0" i="1" smtClean="0">
+                              <a:latin typeface="Cambria Math"/>
+                            </a:rPr>
+                          </m:ctrlPr>
+                        </m:dPr>
+                        <m:e>
+                          <m:m>
+                            <m:mPr>
+                              <m:mcs>
+                                <m:mc>
+                                  <m:mcPr>
+                                    <m:count m:val="3"/>
+                                    <m:mcJc m:val="center"/>
+                                  </m:mcPr>
+                                </m:mc>
+                              </m:mcs>
+                              <m:ctrlPr>
+                                <a:rPr lang="en-US" sz="1600" b="0" i="1" smtClean="0">
+                                  <a:latin typeface="Cambria Math"/>
+                                </a:rPr>
+                              </m:ctrlPr>
+                            </m:mPr>
+                            <m:mr>
+                              <m:e/>
+                              <m:e/>
+                              <m:e/>
+                            </m:mr>
+                            <m:mr>
+                              <m:e>
+                                <m:sSub>
+                                  <m:sSubPr>
+                                    <m:ctrlPr>
+                                      <a:rPr lang="en-US" sz="1600" b="0" i="1" smtClean="0">
+                                        <a:latin typeface="Cambria Math"/>
+                                      </a:rPr>
+                                    </m:ctrlPr>
+                                  </m:sSubPr>
+                                  <m:e>
+                                    <m:r>
+                                      <a:rPr lang="en-US" sz="1600" b="0" i="1" smtClean="0">
+                                        <a:latin typeface="Cambria Math"/>
+                                      </a:rPr>
+                                      <m:t>𝑟</m:t>
+                                    </m:r>
+                                  </m:e>
+                                  <m:sub>
+                                    <m:r>
+                                      <a:rPr lang="en-US" sz="1600" b="0" i="1" smtClean="0">
+                                        <a:latin typeface="Cambria Math"/>
+                                      </a:rPr>
+                                      <m:t>1</m:t>
+                                    </m:r>
+                                  </m:sub>
+                                </m:sSub>
+                              </m:e>
+                              <m:e>
+                                <m:sSub>
+                                  <m:sSubPr>
+                                    <m:ctrlPr>
+                                      <a:rPr lang="en-US" sz="1600" b="0" i="1" smtClean="0">
+                                        <a:latin typeface="Cambria Math"/>
+                                      </a:rPr>
+                                    </m:ctrlPr>
+                                  </m:sSubPr>
+                                  <m:e>
+                                    <m:r>
+                                      <a:rPr lang="en-US" sz="1600" b="0" i="1" smtClean="0">
+                                        <a:latin typeface="Cambria Math"/>
+                                      </a:rPr>
+                                      <m:t>𝑟</m:t>
+                                    </m:r>
+                                  </m:e>
+                                  <m:sub>
+                                    <m:r>
+                                      <a:rPr lang="en-US" sz="1600" b="0" i="1" smtClean="0">
+                                        <a:latin typeface="Cambria Math"/>
+                                      </a:rPr>
+                                      <m:t>2</m:t>
+                                    </m:r>
+                                  </m:sub>
+                                </m:sSub>
+                              </m:e>
+                              <m:e>
+                                <m:r>
+                                  <a:rPr lang="en-US" sz="1600" b="0" i="1" smtClean="0">
+                                    <a:latin typeface="Cambria Math"/>
+                                  </a:rPr>
+                                  <m:t>𝑡</m:t>
+                                </m:r>
+                              </m:e>
+                            </m:mr>
+                            <m:mr>
+                              <m:e/>
+                              <m:e/>
+                              <m:e/>
+                            </m:mr>
+                          </m:m>
+                        </m:e>
+                      </m:d>
+                      <m:d>
+                        <m:dPr>
+                          <m:ctrlPr>
+                            <a:rPr lang="en-US" sz="1600" b="0" i="1" smtClean="0">
+                              <a:latin typeface="Cambria Math"/>
+                            </a:rPr>
+                          </m:ctrlPr>
+                        </m:dPr>
+                        <m:e>
+                          <m:m>
+                            <m:mPr>
+                              <m:mcs>
+                                <m:mc>
+                                  <m:mcPr>
+                                    <m:count m:val="1"/>
+                                    <m:mcJc m:val="center"/>
+                                  </m:mcPr>
+                                </m:mc>
+                              </m:mcs>
+                              <m:ctrlPr>
+                                <a:rPr lang="en-US" sz="1600" b="0" i="1" smtClean="0">
+                                  <a:latin typeface="Cambria Math"/>
+                                </a:rPr>
+                              </m:ctrlPr>
+                            </m:mPr>
+                            <m:mr>
+                              <m:e>
+                                <m:r>
+                                  <m:rPr>
+                                    <m:brk m:alnAt="7"/>
+                                  </m:rPr>
+                                  <a:rPr lang="en-US" sz="1600" b="0" i="1" smtClean="0">
+                                    <a:latin typeface="Cambria Math"/>
+                                  </a:rPr>
+                                  <m:t>𝑋</m:t>
+                                </m:r>
+                              </m:e>
+                            </m:mr>
+                            <m:mr>
+                              <m:e>
+                                <m:r>
+                                  <a:rPr lang="en-US" sz="1600" b="0" i="1" smtClean="0">
+                                    <a:latin typeface="Cambria Math"/>
+                                  </a:rPr>
+                                  <m:t>𝑌</m:t>
+                                </m:r>
+                              </m:e>
+                            </m:mr>
+                            <m:mr>
+                              <m:e>
+                                <m:r>
+                                  <a:rPr lang="en-US" sz="1600" b="0" i="1" smtClean="0">
+                                    <a:latin typeface="Cambria Math"/>
+                                  </a:rPr>
+                                  <m:t>1</m:t>
+                                </m:r>
+                              </m:e>
+                            </m:mr>
+                          </m:m>
+                        </m:e>
+                      </m:d>
+                    </m:oMath>
+                  </m:oMathPara>
+                </a14:m>
+                <a:endParaRPr lang="en-US" sz="1600" dirty="0"/>
+              </a:p>
+            </p:txBody>
+          </p:sp>
+        </mc:Choice>
+        <mc:Fallback xmlns="">
+          <p:sp>
+            <p:nvSpPr>
+              <p:cNvPr id="11" name="TextBox 10"/>
+              <p:cNvSpPr txBox="1">
+                <a:spLocks noRot="1" noChangeAspect="1" noMove="1" noResize="1" noEditPoints="1" noAdjustHandles="1" noChangeArrowheads="1" noChangeShapeType="1" noTextEdit="1"/>
+              </p:cNvSpPr>
+              <p:nvPr/>
+            </p:nvSpPr>
+            <p:spPr>
+              <a:xfrm>
+                <a:off x="313039" y="3429000"/>
+                <a:ext cx="5325761" cy="789512"/>
               </a:xfrm>
               <a:prstGeom prst="rect">
                 <a:avLst/>
@@ -9609,7 +11637,207 @@
               <a:blipFill rotWithShape="1">
                 <a:blip r:embed="rId8"/>
                 <a:stretch>
-                  <a:fillRect l="-1524" t="-971" b="-2136"/>
+                  <a:fillRect/>
+                </a:stretch>
+              </a:blipFill>
+            </p:spPr>
+            <p:txBody>
+              <a:bodyPr/>
+              <a:lstStyle/>
+              <a:p>
+                <a:r>
+                  <a:rPr lang="en-US">
+                    <a:noFill/>
+                  </a:rPr>
+                  <a:t> </a:t>
+                </a:r>
+              </a:p>
+            </p:txBody>
+          </p:sp>
+        </mc:Fallback>
+      </mc:AlternateContent>
+      <mc:AlternateContent xmlns:mc="http://schemas.openxmlformats.org/markup-compatibility/2006" xmlns:a14="http://schemas.microsoft.com/office/drawing/2010/main">
+        <mc:Choice Requires="a14">
+          <p:sp>
+            <p:nvSpPr>
+              <p:cNvPr id="12" name="TextBox 11"/>
+              <p:cNvSpPr txBox="1"/>
+              <p:nvPr/>
+            </p:nvSpPr>
+            <p:spPr>
+              <a:xfrm>
+                <a:off x="276225" y="4294712"/>
+                <a:ext cx="5325761" cy="789512"/>
+              </a:xfrm>
+              <a:prstGeom prst="rect">
+                <a:avLst/>
+              </a:prstGeom>
+              <a:noFill/>
+            </p:spPr>
+            <p:txBody>
+              <a:bodyPr wrap="square" rtlCol="0">
+                <a:spAutoFit/>
+              </a:bodyPr>
+              <a:lstStyle/>
+              <a:p>
+                <a:pPr/>
+                <a14:m>
+                  <m:oMathPara xmlns:m="http://schemas.openxmlformats.org/officeDocument/2006/math">
+                    <m:oMathParaPr>
+                      <m:jc m:val="centerGroup"/>
+                    </m:oMathParaPr>
+                    <m:oMath xmlns:m="http://schemas.openxmlformats.org/officeDocument/2006/math">
+                      <m:r>
+                        <a:rPr lang="en-US" sz="1600" b="0" i="1" smtClean="0">
+                          <a:latin typeface="Cambria Math"/>
+                        </a:rPr>
+                        <m:t>𝐾</m:t>
+                      </m:r>
+                      <m:d>
+                        <m:dPr>
+                          <m:begChr m:val="["/>
+                          <m:endChr m:val="]"/>
+                          <m:ctrlPr>
+                            <a:rPr lang="en-US" sz="1600" b="0" i="1" smtClean="0">
+                              <a:latin typeface="Cambria Math"/>
+                            </a:rPr>
+                          </m:ctrlPr>
+                        </m:dPr>
+                        <m:e>
+                          <m:m>
+                            <m:mPr>
+                              <m:mcs>
+                                <m:mc>
+                                  <m:mcPr>
+                                    <m:count m:val="3"/>
+                                    <m:mcJc m:val="center"/>
+                                  </m:mcPr>
+                                </m:mc>
+                              </m:mcs>
+                              <m:ctrlPr>
+                                <a:rPr lang="en-US" sz="1600" b="0" i="1" smtClean="0">
+                                  <a:latin typeface="Cambria Math"/>
+                                </a:rPr>
+                              </m:ctrlPr>
+                            </m:mPr>
+                            <m:mr>
+                              <m:e/>
+                              <m:e/>
+                              <m:e/>
+                            </m:mr>
+                            <m:mr>
+                              <m:e>
+                                <m:sSub>
+                                  <m:sSubPr>
+                                    <m:ctrlPr>
+                                      <a:rPr lang="en-US" sz="1600" b="0" i="1" smtClean="0">
+                                        <a:latin typeface="Cambria Math"/>
+                                      </a:rPr>
+                                    </m:ctrlPr>
+                                  </m:sSubPr>
+                                  <m:e>
+                                    <m:r>
+                                      <a:rPr lang="en-US" sz="1600" b="0" i="1" smtClean="0">
+                                        <a:latin typeface="Cambria Math"/>
+                                      </a:rPr>
+                                      <m:t>𝑟</m:t>
+                                    </m:r>
+                                  </m:e>
+                                  <m:sub>
+                                    <m:r>
+                                      <a:rPr lang="en-US" sz="1600" b="0" i="1" smtClean="0">
+                                        <a:latin typeface="Cambria Math"/>
+                                      </a:rPr>
+                                      <m:t>1</m:t>
+                                    </m:r>
+                                  </m:sub>
+                                </m:sSub>
+                              </m:e>
+                              <m:e>
+                                <m:sSub>
+                                  <m:sSubPr>
+                                    <m:ctrlPr>
+                                      <a:rPr lang="en-US" sz="1600" b="0" i="1" smtClean="0">
+                                        <a:latin typeface="Cambria Math"/>
+                                      </a:rPr>
+                                    </m:ctrlPr>
+                                  </m:sSubPr>
+                                  <m:e>
+                                    <m:r>
+                                      <a:rPr lang="en-US" sz="1600" b="0" i="1" smtClean="0">
+                                        <a:latin typeface="Cambria Math"/>
+                                      </a:rPr>
+                                      <m:t>𝑟</m:t>
+                                    </m:r>
+                                  </m:e>
+                                  <m:sub>
+                                    <m:r>
+                                      <a:rPr lang="en-US" sz="1600" b="0" i="1" smtClean="0">
+                                        <a:latin typeface="Cambria Math"/>
+                                      </a:rPr>
+                                      <m:t>2</m:t>
+                                    </m:r>
+                                  </m:sub>
+                                </m:sSub>
+                              </m:e>
+                              <m:e>
+                                <m:r>
+                                  <a:rPr lang="en-US" sz="1600" b="0" i="1" smtClean="0">
+                                    <a:latin typeface="Cambria Math"/>
+                                  </a:rPr>
+                                  <m:t>𝑡</m:t>
+                                </m:r>
+                              </m:e>
+                            </m:mr>
+                            <m:mr>
+                              <m:e/>
+                              <m:e/>
+                              <m:e/>
+                            </m:mr>
+                          </m:m>
+                        </m:e>
+                      </m:d>
+                      <m:r>
+                        <a:rPr lang="en-US" sz="1600" b="0" i="1" smtClean="0">
+                          <a:latin typeface="Cambria Math"/>
+                        </a:rPr>
+                        <m:t>=</m:t>
+                      </m:r>
+                      <m:r>
+                        <a:rPr lang="en-US" sz="1600" b="0" i="1" smtClean="0">
+                          <a:latin typeface="Cambria Math"/>
+                        </a:rPr>
+                        <m:t>𝐻</m:t>
+                      </m:r>
+                    </m:oMath>
+                  </m:oMathPara>
+                </a14:m>
+                <a:endParaRPr lang="en-US" sz="1600" dirty="0"/>
+              </a:p>
+            </p:txBody>
+          </p:sp>
+        </mc:Choice>
+        <mc:Fallback xmlns="">
+          <p:sp>
+            <p:nvSpPr>
+              <p:cNvPr id="12" name="TextBox 11"/>
+              <p:cNvSpPr txBox="1">
+                <a:spLocks noRot="1" noChangeAspect="1" noMove="1" noResize="1" noEditPoints="1" noAdjustHandles="1" noChangeArrowheads="1" noChangeShapeType="1" noTextEdit="1"/>
+              </p:cNvSpPr>
+              <p:nvPr/>
+            </p:nvSpPr>
+            <p:spPr>
+              <a:xfrm>
+                <a:off x="276225" y="4294712"/>
+                <a:ext cx="5325761" cy="789512"/>
+              </a:xfrm>
+              <a:prstGeom prst="rect">
+                <a:avLst/>
+              </a:prstGeom>
+              <a:blipFill rotWithShape="1">
+                <a:blip r:embed="rId9"/>
+                <a:stretch>
+                  <a:fillRect/>
                 </a:stretch>
               </a:blipFill>
             </p:spPr>
@@ -9630,14 +11858,14 @@
       </mc:AlternateContent>
       <p:sp>
         <p:nvSpPr>
-          <p:cNvPr id="8" name="TextBox 7"/>
+          <p:cNvPr id="9" name="TextBox 8"/>
           <p:cNvSpPr txBox="1"/>
           <p:nvPr/>
         </p:nvSpPr>
         <p:spPr>
           <a:xfrm>
-            <a:off x="4267200" y="4876800"/>
-            <a:ext cx="4343400" cy="646331"/>
+            <a:off x="3377514" y="5396299"/>
+            <a:ext cx="4677222" cy="646331"/>
           </a:xfrm>
           <a:prstGeom prst="rect">
             <a:avLst/>
@@ -9651,10 +11879,18 @@
           <a:lstStyle/>
           <a:p>
             <a:r>
-              <a:rPr lang="en-US" b="1" dirty="0" smtClean="0"/>
-              <a:t>Since we only have one camera, we will have to know K and X, Y, Z</a:t>
-            </a:r>
-            <a:endParaRPr lang="en-US" b="1" dirty="0"/>
+              <a:rPr lang="en-US" b="1" dirty="0" smtClean="0">
+                <a:solidFill>
+                  <a:srgbClr val="FF0000"/>
+                </a:solidFill>
+              </a:rPr>
+              <a:t>Our goal is to solve R and C, knowing K, H and corresponding sets of points (x, y) -&gt; (X, Y, Z=0)</a:t>
+            </a:r>
+            <a:endParaRPr lang="en-US" b="1" dirty="0">
+              <a:solidFill>
+                <a:srgbClr val="FF0000"/>
+              </a:solidFill>
+            </a:endParaRPr>
           </a:p>
         </p:txBody>
       </p:sp>
@@ -9720,7 +11956,7 @@
       </p:sp>
       <p:pic>
         <p:nvPicPr>
-          <p:cNvPr id="2051" name="Picture 3"/>
+          <p:cNvPr id="2050" name="Picture 2"/>
           <p:cNvPicPr>
             <a:picLocks noChangeAspect="1" noChangeArrowheads="1"/>
           </p:cNvPicPr>
@@ -9741,8 +11977,8 @@
         </p:blipFill>
         <p:spPr bwMode="auto">
           <a:xfrm>
-            <a:off x="1905000" y="1295400"/>
-            <a:ext cx="5638800" cy="5064259"/>
+            <a:off x="457200" y="1295400"/>
+            <a:ext cx="8153400" cy="4674816"/>
           </a:xfrm>
           <a:prstGeom prst="rect">
             <a:avLst/>
@@ -9950,8 +12186,8 @@
           </a:p>
         </p:txBody>
       </p:sp>
-      <mc:AlternateContent xmlns:mc="http://schemas.openxmlformats.org/markup-compatibility/2006">
-        <mc:Choice xmlns:a14="http://schemas.microsoft.com/office/drawing/2010/main" Requires="a14">
+      <mc:AlternateContent xmlns:mc="http://schemas.openxmlformats.org/markup-compatibility/2006" xmlns:a14="http://schemas.microsoft.com/office/drawing/2010/main">
+        <mc:Choice Requires="a14">
           <p:sp>
             <p:nvSpPr>
               <p:cNvPr id="4" name="Content Placeholder 3"/>
@@ -9979,11 +12215,7 @@
                 </a:r>
                 <a:r>
                   <a:rPr lang="en-US" sz="2400" dirty="0" smtClean="0"/>
-                  <a:t> </a:t>
-                </a:r>
-                <a:r>
-                  <a:rPr lang="en-US" sz="2400" dirty="0" smtClean="0"/>
-                  <a:t>Docs</a:t>
+                  <a:t> Docs</a:t>
                 </a:r>
               </a:p>
               <a:p>
@@ -9991,7 +12223,6 @@
                   <a:rPr lang="en-US" sz="2400" dirty="0" smtClean="0"/>
                   <a:t>15-20 images were taken in order to get better result by averaging</a:t>
                 </a:r>
-                <a:endParaRPr lang="en-US" sz="2400" dirty="0" smtClean="0"/>
               </a:p>
               <a:p>
                 <a14:m>
@@ -10044,7 +12275,13 @@
                                 <a:rPr lang="en-US" sz="2400" b="0" i="1" smtClean="0">
                                   <a:latin typeface="Cambria Math"/>
                                 </a:rPr>
-                                <m:t>700.38</m:t>
+                                <m:t>7</m:t>
+                              </m:r>
+                              <m:r>
+                                <a:rPr lang="en-US" sz="2400" b="0" i="1" smtClean="0">
+                                  <a:latin typeface="Cambria Math"/>
+                                </a:rPr>
+                                <m:t>00.38</m:t>
                               </m:r>
                             </m:e>
                             <m:e>
@@ -10126,7 +12363,7 @@
             </p:txBody>
           </p:sp>
         </mc:Choice>
-        <mc:Fallback>
+        <mc:Fallback xmlns="">
           <p:sp>
             <p:nvSpPr>
               <p:cNvPr id="4" name="Content Placeholder 3"/>
@@ -10222,7 +12459,7 @@
         </p:nvSpPr>
         <p:spPr>
           <a:xfrm>
-            <a:off x="2278602" y="5597149"/>
+            <a:off x="2288127" y="6045738"/>
             <a:ext cx="6248400" cy="461665"/>
           </a:xfrm>
           <a:prstGeom prst="rect">
@@ -10454,31 +12691,31 @@
         </p:nvSpPr>
         <p:spPr>
           <a:xfrm>
-            <a:off x="152400" y="1143000"/>
-            <a:ext cx="3733800" cy="4525963"/>
+            <a:off x="228600" y="1676400"/>
+            <a:ext cx="3733800" cy="3558177"/>
           </a:xfrm>
         </p:spPr>
         <p:txBody>
           <a:bodyPr>
-            <a:normAutofit/>
+            <a:normAutofit lnSpcReduction="10000"/>
           </a:bodyPr>
           <a:lstStyle/>
           <a:p>
             <a:r>
               <a:rPr lang="en-US" sz="2000" dirty="0" smtClean="0"/>
-              <a:t>Convert RGB to HSV</a:t>
+              <a:t>Convert RGB (Red/Green/Blue) to HSV (Hue/Saturation/Value)</a:t>
             </a:r>
           </a:p>
           <a:p>
             <a:r>
               <a:rPr lang="en-US" sz="2000" dirty="0" smtClean="0"/>
-              <a:t>Build binary mask of the image Based on the Hue, Saturation and Value of the red square color</a:t>
+              <a:t>Build binary mask of the image Based on the Hue, Saturation and Value thresholds of the red square color</a:t>
             </a:r>
           </a:p>
           <a:p>
             <a:r>
               <a:rPr lang="en-US" sz="2000" dirty="0" smtClean="0"/>
-              <a:t>Get rid of small noise by counting the pixels (contour area in terms of </a:t>
+              <a:t>Get rid of small noise by counting the # of pixels (contour area in terms of </a:t>
             </a:r>
             <a:r>
               <a:rPr lang="en-US" sz="2000" dirty="0" err="1" smtClean="0"/>

</xml_diff>

<commit_message>
Fixed Presentation, Added README and License
</commit_message>
<xml_diff>
--- a/paper_presentation/Monocamera Recovery.pptx
+++ b/paper_presentation/Monocamera Recovery.pptx
@@ -206,7 +206,7 @@
           <a:p>
             <a:fld id="{4CDF4B4D-C26F-45E1-8B5D-EB0AB242FC95}" type="datetimeFigureOut">
               <a:rPr lang="en-US" smtClean="0"/>
-              <a:t>5/8/2013</a:t>
+              <a:t>5/11/2013</a:t>
             </a:fld>
             <a:endParaRPr lang="en-US"/>
           </a:p>
@@ -1485,7 +1485,7 @@
           <a:p>
             <a:fld id="{21F389F5-5388-4C21-BF3E-899451C5E555}" type="datetimeFigureOut">
               <a:rPr lang="en-US" smtClean="0"/>
-              <a:t>5/8/2013</a:t>
+              <a:t>5/11/2013</a:t>
             </a:fld>
             <a:endParaRPr lang="en-US"/>
           </a:p>
@@ -1655,7 +1655,7 @@
           <a:p>
             <a:fld id="{21F389F5-5388-4C21-BF3E-899451C5E555}" type="datetimeFigureOut">
               <a:rPr lang="en-US" smtClean="0"/>
-              <a:t>5/8/2013</a:t>
+              <a:t>5/11/2013</a:t>
             </a:fld>
             <a:endParaRPr lang="en-US"/>
           </a:p>
@@ -1835,7 +1835,7 @@
           <a:p>
             <a:fld id="{21F389F5-5388-4C21-BF3E-899451C5E555}" type="datetimeFigureOut">
               <a:rPr lang="en-US" smtClean="0"/>
-              <a:t>5/8/2013</a:t>
+              <a:t>5/11/2013</a:t>
             </a:fld>
             <a:endParaRPr lang="en-US"/>
           </a:p>
@@ -2005,7 +2005,7 @@
           <a:p>
             <a:fld id="{21F389F5-5388-4C21-BF3E-899451C5E555}" type="datetimeFigureOut">
               <a:rPr lang="en-US" smtClean="0"/>
-              <a:t>5/8/2013</a:t>
+              <a:t>5/11/2013</a:t>
             </a:fld>
             <a:endParaRPr lang="en-US"/>
           </a:p>
@@ -2251,7 +2251,7 @@
           <a:p>
             <a:fld id="{21F389F5-5388-4C21-BF3E-899451C5E555}" type="datetimeFigureOut">
               <a:rPr lang="en-US" smtClean="0"/>
-              <a:t>5/8/2013</a:t>
+              <a:t>5/11/2013</a:t>
             </a:fld>
             <a:endParaRPr lang="en-US"/>
           </a:p>
@@ -2539,7 +2539,7 @@
           <a:p>
             <a:fld id="{21F389F5-5388-4C21-BF3E-899451C5E555}" type="datetimeFigureOut">
               <a:rPr lang="en-US" smtClean="0"/>
-              <a:t>5/8/2013</a:t>
+              <a:t>5/11/2013</a:t>
             </a:fld>
             <a:endParaRPr lang="en-US"/>
           </a:p>
@@ -2961,7 +2961,7 @@
           <a:p>
             <a:fld id="{21F389F5-5388-4C21-BF3E-899451C5E555}" type="datetimeFigureOut">
               <a:rPr lang="en-US" smtClean="0"/>
-              <a:t>5/8/2013</a:t>
+              <a:t>5/11/2013</a:t>
             </a:fld>
             <a:endParaRPr lang="en-US"/>
           </a:p>
@@ -3079,7 +3079,7 @@
           <a:p>
             <a:fld id="{21F389F5-5388-4C21-BF3E-899451C5E555}" type="datetimeFigureOut">
               <a:rPr lang="en-US" smtClean="0"/>
-              <a:t>5/8/2013</a:t>
+              <a:t>5/11/2013</a:t>
             </a:fld>
             <a:endParaRPr lang="en-US"/>
           </a:p>
@@ -3174,7 +3174,7 @@
           <a:p>
             <a:fld id="{21F389F5-5388-4C21-BF3E-899451C5E555}" type="datetimeFigureOut">
               <a:rPr lang="en-US" smtClean="0"/>
-              <a:t>5/8/2013</a:t>
+              <a:t>5/11/2013</a:t>
             </a:fld>
             <a:endParaRPr lang="en-US"/>
           </a:p>
@@ -3451,7 +3451,7 @@
           <a:p>
             <a:fld id="{21F389F5-5388-4C21-BF3E-899451C5E555}" type="datetimeFigureOut">
               <a:rPr lang="en-US" smtClean="0"/>
-              <a:t>5/8/2013</a:t>
+              <a:t>5/11/2013</a:t>
             </a:fld>
             <a:endParaRPr lang="en-US"/>
           </a:p>
@@ -3704,7 +3704,7 @@
           <a:p>
             <a:fld id="{21F389F5-5388-4C21-BF3E-899451C5E555}" type="datetimeFigureOut">
               <a:rPr lang="en-US" smtClean="0"/>
-              <a:t>5/8/2013</a:t>
+              <a:t>5/11/2013</a:t>
             </a:fld>
             <a:endParaRPr lang="en-US"/>
           </a:p>
@@ -3917,7 +3917,7 @@
           <a:p>
             <a:fld id="{21F389F5-5388-4C21-BF3E-899451C5E555}" type="datetimeFigureOut">
               <a:rPr lang="en-US" smtClean="0"/>
-              <a:t>5/8/2013</a:t>
+              <a:t>5/11/2013</a:t>
             </a:fld>
             <a:endParaRPr lang="en-US"/>
           </a:p>
@@ -4377,16 +4377,8 @@
           <a:lstStyle/>
           <a:p>
             <a:r>
-              <a:rPr lang="en-US" b="1" cap="all" dirty="0"/>
-              <a:t>recovering 3d information with a </a:t>
-            </a:r>
-            <a:r>
-              <a:rPr lang="en-US" b="1" cap="all" dirty="0" err="1"/>
-              <a:t>sinGle</a:t>
-            </a:r>
-            <a:r>
-              <a:rPr lang="en-US" b="1" cap="all" dirty="0"/>
-              <a:t> camera</a:t>
+              <a:rPr lang="en-US" b="1" cap="all"/>
+              <a:t>RECOVERING 3D INFORMATION WITH A SINGLE CAMERA</a:t>
             </a:r>
             <a:endParaRPr lang="en-US" b="1" dirty="0"/>
           </a:p>
@@ -9759,11 +9751,7 @@
           <a:p>
             <a:r>
               <a:rPr lang="en-US" dirty="0" smtClean="0"/>
-              <a:t>Use continuity of video stream to improve corner </a:t>
-            </a:r>
-            <a:r>
-              <a:rPr lang="en-US" dirty="0" smtClean="0"/>
-              <a:t>detection</a:t>
+              <a:t>Use continuity of video stream to improve corner detection</a:t>
             </a:r>
           </a:p>
           <a:p>
@@ -10106,11 +10094,7 @@
           <a:p>
             <a:r>
               <a:rPr lang="en-US" dirty="0" smtClean="0"/>
-              <a:t>Why/How </a:t>
-            </a:r>
-            <a:r>
-              <a:rPr lang="en-US" dirty="0" smtClean="0"/>
-              <a:t>it works</a:t>
+              <a:t>Why/How it works</a:t>
             </a:r>
           </a:p>
           <a:p>
@@ -13131,11 +13115,7 @@
           <a:p>
             <a:r>
               <a:rPr lang="en-US" sz="1800" dirty="0" smtClean="0"/>
-              <a:t>Find all the possible Corners in the picture using Harris Corner Detection </a:t>
-            </a:r>
-            <a:r>
-              <a:rPr lang="en-US" sz="1800" dirty="0" smtClean="0"/>
-              <a:t>Algorithm</a:t>
+              <a:t>Find all the possible Corners in the picture using Harris Corner Detection Algorithm</a:t>
             </a:r>
           </a:p>
           <a:p>
@@ -13143,7 +13123,6 @@
               <a:rPr lang="en-US" sz="1800" dirty="0" smtClean="0"/>
               <a:t>Uses blue-color channel to improve contrast to red square</a:t>
             </a:r>
-            <a:endParaRPr lang="en-US" sz="1800" dirty="0" smtClean="0"/>
           </a:p>
           <a:p>
             <a:r>

</xml_diff>